<commit_message>
add files from the configuration
</commit_message>
<xml_diff>
--- a/MiCa-expo-app.pptx
+++ b/MiCa-expo-app.pptx
@@ -5,14 +5,16 @@
     <p:sldMasterId id="2147483648" r:id="rId1"/>
   </p:sldMasterIdLst>
   <p:notesMasterIdLst>
-    <p:notesMasterId r:id="rId7"/>
+    <p:notesMasterId r:id="rId9"/>
   </p:notesMasterIdLst>
   <p:sldIdLst>
     <p:sldId id="256" r:id="rId2"/>
     <p:sldId id="257" r:id="rId3"/>
     <p:sldId id="261" r:id="rId4"/>
     <p:sldId id="259" r:id="rId5"/>
-    <p:sldId id="260" r:id="rId6"/>
+    <p:sldId id="262" r:id="rId6"/>
+    <p:sldId id="260" r:id="rId7"/>
+    <p:sldId id="263" r:id="rId8"/>
   </p:sldIdLst>
   <p:sldSz cx="12192000" cy="6858000"/>
   <p:notesSz cx="6858000" cy="9144000"/>
@@ -111,7 +113,2521 @@
       </a:defRPr>
     </a:lvl9pPr>
   </p:defaultTextStyle>
+  <p:extLst>
+    <p:ext uri="{EFAFB233-063F-42B5-8137-9DF3F51BA10A}">
+      <p15:sldGuideLst xmlns:p15="http://schemas.microsoft.com/office/powerpoint/2012/main"/>
+    </p:ext>
+  </p:extLst>
 </p:presentation>
+</file>
+
+<file path=ppt/diagrams/colors1.xml><?xml version="1.0" encoding="utf-8"?>
+<dgm:colorsDef xmlns:dgm="http://schemas.openxmlformats.org/drawingml/2006/diagram" xmlns:a="http://schemas.openxmlformats.org/drawingml/2006/main" uniqueId="urn:microsoft.com/office/officeart/2005/8/colors/accent1_2">
+  <dgm:title val=""/>
+  <dgm:desc val=""/>
+  <dgm:catLst>
+    <dgm:cat type="accent1" pri="11200"/>
+  </dgm:catLst>
+  <dgm:styleLbl name="node0">
+    <dgm:fillClrLst meth="repeat">
+      <a:schemeClr val="accent1"/>
+    </dgm:fillClrLst>
+    <dgm:linClrLst meth="repeat">
+      <a:schemeClr val="lt1"/>
+    </dgm:linClrLst>
+    <dgm:effectClrLst/>
+    <dgm:txLinClrLst/>
+    <dgm:txFillClrLst/>
+    <dgm:txEffectClrLst/>
+  </dgm:styleLbl>
+  <dgm:styleLbl name="alignNode1">
+    <dgm:fillClrLst meth="repeat">
+      <a:schemeClr val="accent1"/>
+    </dgm:fillClrLst>
+    <dgm:linClrLst meth="repeat">
+      <a:schemeClr val="accent1"/>
+    </dgm:linClrLst>
+    <dgm:effectClrLst/>
+    <dgm:txLinClrLst/>
+    <dgm:txFillClrLst/>
+    <dgm:txEffectClrLst/>
+  </dgm:styleLbl>
+  <dgm:styleLbl name="node1">
+    <dgm:fillClrLst meth="repeat">
+      <a:schemeClr val="accent1"/>
+    </dgm:fillClrLst>
+    <dgm:linClrLst meth="repeat">
+      <a:schemeClr val="lt1"/>
+    </dgm:linClrLst>
+    <dgm:effectClrLst/>
+    <dgm:txLinClrLst/>
+    <dgm:txFillClrLst/>
+    <dgm:txEffectClrLst/>
+  </dgm:styleLbl>
+  <dgm:styleLbl name="lnNode1">
+    <dgm:fillClrLst meth="repeat">
+      <a:schemeClr val="accent1"/>
+    </dgm:fillClrLst>
+    <dgm:linClrLst meth="repeat">
+      <a:schemeClr val="lt1"/>
+    </dgm:linClrLst>
+    <dgm:effectClrLst/>
+    <dgm:txLinClrLst/>
+    <dgm:txFillClrLst/>
+    <dgm:txEffectClrLst/>
+  </dgm:styleLbl>
+  <dgm:styleLbl name="vennNode1">
+    <dgm:fillClrLst meth="repeat">
+      <a:schemeClr val="accent1">
+        <a:alpha val="50000"/>
+      </a:schemeClr>
+    </dgm:fillClrLst>
+    <dgm:linClrLst meth="repeat">
+      <a:schemeClr val="lt1"/>
+    </dgm:linClrLst>
+    <dgm:effectClrLst/>
+    <dgm:txLinClrLst/>
+    <dgm:txFillClrLst/>
+    <dgm:txEffectClrLst/>
+  </dgm:styleLbl>
+  <dgm:styleLbl name="node2">
+    <dgm:fillClrLst meth="repeat">
+      <a:schemeClr val="accent1"/>
+    </dgm:fillClrLst>
+    <dgm:linClrLst meth="repeat">
+      <a:schemeClr val="lt1"/>
+    </dgm:linClrLst>
+    <dgm:effectClrLst/>
+    <dgm:txLinClrLst/>
+    <dgm:txFillClrLst/>
+    <dgm:txEffectClrLst/>
+  </dgm:styleLbl>
+  <dgm:styleLbl name="node3">
+    <dgm:fillClrLst meth="repeat">
+      <a:schemeClr val="accent1"/>
+    </dgm:fillClrLst>
+    <dgm:linClrLst meth="repeat">
+      <a:schemeClr val="lt1"/>
+    </dgm:linClrLst>
+    <dgm:effectClrLst/>
+    <dgm:txLinClrLst/>
+    <dgm:txFillClrLst/>
+    <dgm:txEffectClrLst/>
+  </dgm:styleLbl>
+  <dgm:styleLbl name="node4">
+    <dgm:fillClrLst meth="repeat">
+      <a:schemeClr val="accent1"/>
+    </dgm:fillClrLst>
+    <dgm:linClrLst meth="repeat">
+      <a:schemeClr val="lt1"/>
+    </dgm:linClrLst>
+    <dgm:effectClrLst/>
+    <dgm:txLinClrLst/>
+    <dgm:txFillClrLst/>
+    <dgm:txEffectClrLst/>
+  </dgm:styleLbl>
+  <dgm:styleLbl name="fgImgPlace1">
+    <dgm:fillClrLst meth="repeat">
+      <a:schemeClr val="accent1">
+        <a:tint val="50000"/>
+      </a:schemeClr>
+    </dgm:fillClrLst>
+    <dgm:linClrLst meth="repeat">
+      <a:schemeClr val="lt1"/>
+    </dgm:linClrLst>
+    <dgm:effectClrLst/>
+    <dgm:txLinClrLst/>
+    <dgm:txFillClrLst meth="repeat">
+      <a:schemeClr val="lt1"/>
+    </dgm:txFillClrLst>
+    <dgm:txEffectClrLst/>
+  </dgm:styleLbl>
+  <dgm:styleLbl name="alignImgPlace1">
+    <dgm:fillClrLst meth="repeat">
+      <a:schemeClr val="accent1">
+        <a:tint val="50000"/>
+      </a:schemeClr>
+    </dgm:fillClrLst>
+    <dgm:linClrLst meth="repeat">
+      <a:schemeClr val="lt1"/>
+    </dgm:linClrLst>
+    <dgm:effectClrLst/>
+    <dgm:txLinClrLst/>
+    <dgm:txFillClrLst meth="repeat">
+      <a:schemeClr val="lt1"/>
+    </dgm:txFillClrLst>
+    <dgm:txEffectClrLst/>
+  </dgm:styleLbl>
+  <dgm:styleLbl name="bgImgPlace1">
+    <dgm:fillClrLst meth="repeat">
+      <a:schemeClr val="accent1">
+        <a:tint val="50000"/>
+      </a:schemeClr>
+    </dgm:fillClrLst>
+    <dgm:linClrLst meth="repeat">
+      <a:schemeClr val="lt1"/>
+    </dgm:linClrLst>
+    <dgm:effectClrLst/>
+    <dgm:txLinClrLst/>
+    <dgm:txFillClrLst meth="repeat">
+      <a:schemeClr val="lt1"/>
+    </dgm:txFillClrLst>
+    <dgm:txEffectClrLst/>
+  </dgm:styleLbl>
+  <dgm:styleLbl name="sibTrans2D1">
+    <dgm:fillClrLst meth="repeat">
+      <a:schemeClr val="accent1">
+        <a:tint val="60000"/>
+      </a:schemeClr>
+    </dgm:fillClrLst>
+    <dgm:linClrLst meth="repeat">
+      <a:schemeClr val="accent1">
+        <a:tint val="60000"/>
+      </a:schemeClr>
+    </dgm:linClrLst>
+    <dgm:effectClrLst/>
+    <dgm:txLinClrLst/>
+    <dgm:txFillClrLst/>
+    <dgm:txEffectClrLst/>
+  </dgm:styleLbl>
+  <dgm:styleLbl name="fgSibTrans2D1">
+    <dgm:fillClrLst meth="repeat">
+      <a:schemeClr val="accent1">
+        <a:tint val="60000"/>
+      </a:schemeClr>
+    </dgm:fillClrLst>
+    <dgm:linClrLst meth="repeat">
+      <a:schemeClr val="accent1">
+        <a:tint val="60000"/>
+      </a:schemeClr>
+    </dgm:linClrLst>
+    <dgm:effectClrLst/>
+    <dgm:txLinClrLst/>
+    <dgm:txFillClrLst/>
+    <dgm:txEffectClrLst/>
+  </dgm:styleLbl>
+  <dgm:styleLbl name="bgSibTrans2D1">
+    <dgm:fillClrLst meth="repeat">
+      <a:schemeClr val="accent1">
+        <a:tint val="60000"/>
+      </a:schemeClr>
+    </dgm:fillClrLst>
+    <dgm:linClrLst meth="repeat">
+      <a:schemeClr val="accent1">
+        <a:tint val="60000"/>
+      </a:schemeClr>
+    </dgm:linClrLst>
+    <dgm:effectClrLst/>
+    <dgm:txLinClrLst/>
+    <dgm:txFillClrLst/>
+    <dgm:txEffectClrLst/>
+  </dgm:styleLbl>
+  <dgm:styleLbl name="sibTrans1D1">
+    <dgm:fillClrLst meth="repeat">
+      <a:schemeClr val="accent1"/>
+    </dgm:fillClrLst>
+    <dgm:linClrLst meth="repeat">
+      <a:schemeClr val="accent1"/>
+    </dgm:linClrLst>
+    <dgm:effectClrLst/>
+    <dgm:txLinClrLst/>
+    <dgm:txFillClrLst meth="repeat">
+      <a:schemeClr val="tx1"/>
+    </dgm:txFillClrLst>
+    <dgm:txEffectClrLst/>
+  </dgm:styleLbl>
+  <dgm:styleLbl name="callout">
+    <dgm:fillClrLst meth="repeat">
+      <a:schemeClr val="accent1"/>
+    </dgm:fillClrLst>
+    <dgm:linClrLst meth="repeat">
+      <a:schemeClr val="accent1">
+        <a:tint val="50000"/>
+      </a:schemeClr>
+    </dgm:linClrLst>
+    <dgm:effectClrLst/>
+    <dgm:txLinClrLst/>
+    <dgm:txFillClrLst meth="repeat">
+      <a:schemeClr val="tx1"/>
+    </dgm:txFillClrLst>
+    <dgm:txEffectClrLst/>
+  </dgm:styleLbl>
+  <dgm:styleLbl name="asst0">
+    <dgm:fillClrLst meth="repeat">
+      <a:schemeClr val="accent1"/>
+    </dgm:fillClrLst>
+    <dgm:linClrLst meth="repeat">
+      <a:schemeClr val="lt1"/>
+    </dgm:linClrLst>
+    <dgm:effectClrLst/>
+    <dgm:txLinClrLst/>
+    <dgm:txFillClrLst/>
+    <dgm:txEffectClrLst/>
+  </dgm:styleLbl>
+  <dgm:styleLbl name="asst1">
+    <dgm:fillClrLst meth="repeat">
+      <a:schemeClr val="accent1"/>
+    </dgm:fillClrLst>
+    <dgm:linClrLst meth="repeat">
+      <a:schemeClr val="lt1"/>
+    </dgm:linClrLst>
+    <dgm:effectClrLst/>
+    <dgm:txLinClrLst/>
+    <dgm:txFillClrLst/>
+    <dgm:txEffectClrLst/>
+  </dgm:styleLbl>
+  <dgm:styleLbl name="asst2">
+    <dgm:fillClrLst meth="repeat">
+      <a:schemeClr val="accent1"/>
+    </dgm:fillClrLst>
+    <dgm:linClrLst meth="repeat">
+      <a:schemeClr val="lt1"/>
+    </dgm:linClrLst>
+    <dgm:effectClrLst/>
+    <dgm:txLinClrLst/>
+    <dgm:txFillClrLst/>
+    <dgm:txEffectClrLst/>
+  </dgm:styleLbl>
+  <dgm:styleLbl name="asst3">
+    <dgm:fillClrLst meth="repeat">
+      <a:schemeClr val="accent1"/>
+    </dgm:fillClrLst>
+    <dgm:linClrLst meth="repeat">
+      <a:schemeClr val="lt1"/>
+    </dgm:linClrLst>
+    <dgm:effectClrLst/>
+    <dgm:txLinClrLst/>
+    <dgm:txFillClrLst/>
+    <dgm:txEffectClrLst/>
+  </dgm:styleLbl>
+  <dgm:styleLbl name="asst4">
+    <dgm:fillClrLst meth="repeat">
+      <a:schemeClr val="accent1"/>
+    </dgm:fillClrLst>
+    <dgm:linClrLst meth="repeat">
+      <a:schemeClr val="lt1"/>
+    </dgm:linClrLst>
+    <dgm:effectClrLst/>
+    <dgm:txLinClrLst/>
+    <dgm:txFillClrLst/>
+    <dgm:txEffectClrLst/>
+  </dgm:styleLbl>
+  <dgm:styleLbl name="parChTrans2D1">
+    <dgm:fillClrLst meth="repeat">
+      <a:schemeClr val="accent1">
+        <a:tint val="60000"/>
+      </a:schemeClr>
+    </dgm:fillClrLst>
+    <dgm:linClrLst meth="repeat">
+      <a:schemeClr val="accent1">
+        <a:tint val="60000"/>
+      </a:schemeClr>
+    </dgm:linClrLst>
+    <dgm:effectClrLst/>
+    <dgm:txLinClrLst/>
+    <dgm:txFillClrLst meth="repeat">
+      <a:schemeClr val="lt1"/>
+    </dgm:txFillClrLst>
+    <dgm:txEffectClrLst/>
+  </dgm:styleLbl>
+  <dgm:styleLbl name="parChTrans2D2">
+    <dgm:fillClrLst meth="repeat">
+      <a:schemeClr val="accent1"/>
+    </dgm:fillClrLst>
+    <dgm:linClrLst meth="repeat">
+      <a:schemeClr val="accent1"/>
+    </dgm:linClrLst>
+    <dgm:effectClrLst/>
+    <dgm:txLinClrLst/>
+    <dgm:txFillClrLst meth="repeat">
+      <a:schemeClr val="lt1"/>
+    </dgm:txFillClrLst>
+    <dgm:txEffectClrLst/>
+  </dgm:styleLbl>
+  <dgm:styleLbl name="parChTrans2D3">
+    <dgm:fillClrLst meth="repeat">
+      <a:schemeClr val="accent1"/>
+    </dgm:fillClrLst>
+    <dgm:linClrLst meth="repeat">
+      <a:schemeClr val="accent1"/>
+    </dgm:linClrLst>
+    <dgm:effectClrLst/>
+    <dgm:txLinClrLst/>
+    <dgm:txFillClrLst meth="repeat">
+      <a:schemeClr val="lt1"/>
+    </dgm:txFillClrLst>
+    <dgm:txEffectClrLst/>
+  </dgm:styleLbl>
+  <dgm:styleLbl name="parChTrans2D4">
+    <dgm:fillClrLst meth="repeat">
+      <a:schemeClr val="accent1"/>
+    </dgm:fillClrLst>
+    <dgm:linClrLst meth="repeat">
+      <a:schemeClr val="accent1"/>
+    </dgm:linClrLst>
+    <dgm:effectClrLst/>
+    <dgm:txLinClrLst/>
+    <dgm:txFillClrLst meth="repeat">
+      <a:schemeClr val="lt1"/>
+    </dgm:txFillClrLst>
+    <dgm:txEffectClrLst/>
+  </dgm:styleLbl>
+  <dgm:styleLbl name="parChTrans1D1">
+    <dgm:fillClrLst meth="repeat">
+      <a:schemeClr val="accent1"/>
+    </dgm:fillClrLst>
+    <dgm:linClrLst meth="repeat">
+      <a:schemeClr val="accent1">
+        <a:shade val="60000"/>
+      </a:schemeClr>
+    </dgm:linClrLst>
+    <dgm:effectClrLst/>
+    <dgm:txLinClrLst/>
+    <dgm:txFillClrLst meth="repeat">
+      <a:schemeClr val="tx1"/>
+    </dgm:txFillClrLst>
+    <dgm:txEffectClrLst/>
+  </dgm:styleLbl>
+  <dgm:styleLbl name="parChTrans1D2">
+    <dgm:fillClrLst meth="repeat">
+      <a:schemeClr val="accent1"/>
+    </dgm:fillClrLst>
+    <dgm:linClrLst meth="repeat">
+      <a:schemeClr val="accent1">
+        <a:shade val="60000"/>
+      </a:schemeClr>
+    </dgm:linClrLst>
+    <dgm:effectClrLst/>
+    <dgm:txLinClrLst/>
+    <dgm:txFillClrLst meth="repeat">
+      <a:schemeClr val="tx1"/>
+    </dgm:txFillClrLst>
+    <dgm:txEffectClrLst/>
+  </dgm:styleLbl>
+  <dgm:styleLbl name="parChTrans1D3">
+    <dgm:fillClrLst meth="repeat">
+      <a:schemeClr val="accent1"/>
+    </dgm:fillClrLst>
+    <dgm:linClrLst meth="repeat">
+      <a:schemeClr val="accent1">
+        <a:shade val="80000"/>
+      </a:schemeClr>
+    </dgm:linClrLst>
+    <dgm:effectClrLst/>
+    <dgm:txLinClrLst/>
+    <dgm:txFillClrLst meth="repeat">
+      <a:schemeClr val="tx1"/>
+    </dgm:txFillClrLst>
+    <dgm:txEffectClrLst/>
+  </dgm:styleLbl>
+  <dgm:styleLbl name="parChTrans1D4">
+    <dgm:fillClrLst meth="repeat">
+      <a:schemeClr val="accent1"/>
+    </dgm:fillClrLst>
+    <dgm:linClrLst meth="repeat">
+      <a:schemeClr val="accent1">
+        <a:shade val="80000"/>
+      </a:schemeClr>
+    </dgm:linClrLst>
+    <dgm:effectClrLst/>
+    <dgm:txLinClrLst/>
+    <dgm:txFillClrLst meth="repeat">
+      <a:schemeClr val="tx1"/>
+    </dgm:txFillClrLst>
+    <dgm:txEffectClrLst/>
+  </dgm:styleLbl>
+  <dgm:styleLbl name="fgAcc1">
+    <dgm:fillClrLst meth="repeat">
+      <a:schemeClr val="lt1">
+        <a:alpha val="90000"/>
+      </a:schemeClr>
+    </dgm:fillClrLst>
+    <dgm:linClrLst meth="repeat">
+      <a:schemeClr val="accent1"/>
+    </dgm:linClrLst>
+    <dgm:effectClrLst/>
+    <dgm:txLinClrLst/>
+    <dgm:txFillClrLst meth="repeat">
+      <a:schemeClr val="dk1"/>
+    </dgm:txFillClrLst>
+    <dgm:txEffectClrLst/>
+  </dgm:styleLbl>
+  <dgm:styleLbl name="conFgAcc1">
+    <dgm:fillClrLst meth="repeat">
+      <a:schemeClr val="lt1">
+        <a:alpha val="90000"/>
+      </a:schemeClr>
+    </dgm:fillClrLst>
+    <dgm:linClrLst meth="repeat">
+      <a:schemeClr val="accent1"/>
+    </dgm:linClrLst>
+    <dgm:effectClrLst/>
+    <dgm:txLinClrLst/>
+    <dgm:txFillClrLst meth="repeat">
+      <a:schemeClr val="dk1"/>
+    </dgm:txFillClrLst>
+    <dgm:txEffectClrLst/>
+  </dgm:styleLbl>
+  <dgm:styleLbl name="alignAcc1">
+    <dgm:fillClrLst meth="repeat">
+      <a:schemeClr val="lt1">
+        <a:alpha val="90000"/>
+      </a:schemeClr>
+    </dgm:fillClrLst>
+    <dgm:linClrLst meth="repeat">
+      <a:schemeClr val="accent1"/>
+    </dgm:linClrLst>
+    <dgm:effectClrLst/>
+    <dgm:txLinClrLst/>
+    <dgm:txFillClrLst meth="repeat">
+      <a:schemeClr val="dk1"/>
+    </dgm:txFillClrLst>
+    <dgm:txEffectClrLst/>
+  </dgm:styleLbl>
+  <dgm:styleLbl name="trAlignAcc1">
+    <dgm:fillClrLst meth="repeat">
+      <a:schemeClr val="lt1">
+        <a:alpha val="40000"/>
+      </a:schemeClr>
+    </dgm:fillClrLst>
+    <dgm:linClrLst meth="repeat">
+      <a:schemeClr val="accent1"/>
+    </dgm:linClrLst>
+    <dgm:effectClrLst/>
+    <dgm:txLinClrLst/>
+    <dgm:txFillClrLst meth="repeat">
+      <a:schemeClr val="dk1"/>
+    </dgm:txFillClrLst>
+    <dgm:txEffectClrLst/>
+  </dgm:styleLbl>
+  <dgm:styleLbl name="bgAcc1">
+    <dgm:fillClrLst meth="repeat">
+      <a:schemeClr val="lt1">
+        <a:alpha val="90000"/>
+      </a:schemeClr>
+    </dgm:fillClrLst>
+    <dgm:linClrLst meth="repeat">
+      <a:schemeClr val="accent1"/>
+    </dgm:linClrLst>
+    <dgm:effectClrLst/>
+    <dgm:txLinClrLst/>
+    <dgm:txFillClrLst meth="repeat">
+      <a:schemeClr val="dk1"/>
+    </dgm:txFillClrLst>
+    <dgm:txEffectClrLst/>
+  </dgm:styleLbl>
+  <dgm:styleLbl name="solidFgAcc1">
+    <dgm:fillClrLst meth="repeat">
+      <a:schemeClr val="lt1"/>
+    </dgm:fillClrLst>
+    <dgm:linClrLst meth="repeat">
+      <a:schemeClr val="accent1"/>
+    </dgm:linClrLst>
+    <dgm:effectClrLst/>
+    <dgm:txLinClrLst/>
+    <dgm:txFillClrLst meth="repeat">
+      <a:schemeClr val="dk1"/>
+    </dgm:txFillClrLst>
+    <dgm:txEffectClrLst/>
+  </dgm:styleLbl>
+  <dgm:styleLbl name="solidAlignAcc1">
+    <dgm:fillClrLst meth="repeat">
+      <a:schemeClr val="lt1"/>
+    </dgm:fillClrLst>
+    <dgm:linClrLst meth="repeat">
+      <a:schemeClr val="accent1"/>
+    </dgm:linClrLst>
+    <dgm:effectClrLst/>
+    <dgm:txLinClrLst/>
+    <dgm:txFillClrLst meth="repeat">
+      <a:schemeClr val="dk1"/>
+    </dgm:txFillClrLst>
+    <dgm:txEffectClrLst/>
+  </dgm:styleLbl>
+  <dgm:styleLbl name="solidBgAcc1">
+    <dgm:fillClrLst meth="repeat">
+      <a:schemeClr val="lt1"/>
+    </dgm:fillClrLst>
+    <dgm:linClrLst meth="repeat">
+      <a:schemeClr val="accent1"/>
+    </dgm:linClrLst>
+    <dgm:effectClrLst/>
+    <dgm:txLinClrLst/>
+    <dgm:txFillClrLst meth="repeat">
+      <a:schemeClr val="dk1"/>
+    </dgm:txFillClrLst>
+    <dgm:txEffectClrLst/>
+  </dgm:styleLbl>
+  <dgm:styleLbl name="fgAccFollowNode1">
+    <dgm:fillClrLst meth="repeat">
+      <a:schemeClr val="accent1">
+        <a:alpha val="90000"/>
+        <a:tint val="40000"/>
+      </a:schemeClr>
+    </dgm:fillClrLst>
+    <dgm:linClrLst meth="repeat">
+      <a:schemeClr val="accent1">
+        <a:alpha val="90000"/>
+        <a:tint val="40000"/>
+      </a:schemeClr>
+    </dgm:linClrLst>
+    <dgm:effectClrLst/>
+    <dgm:txLinClrLst/>
+    <dgm:txFillClrLst meth="repeat">
+      <a:schemeClr val="dk1"/>
+    </dgm:txFillClrLst>
+    <dgm:txEffectClrLst/>
+  </dgm:styleLbl>
+  <dgm:styleLbl name="alignAccFollowNode1">
+    <dgm:fillClrLst meth="repeat">
+      <a:schemeClr val="accent1">
+        <a:alpha val="90000"/>
+        <a:tint val="40000"/>
+      </a:schemeClr>
+    </dgm:fillClrLst>
+    <dgm:linClrLst meth="repeat">
+      <a:schemeClr val="accent1">
+        <a:alpha val="90000"/>
+        <a:tint val="40000"/>
+      </a:schemeClr>
+    </dgm:linClrLst>
+    <dgm:effectClrLst/>
+    <dgm:txLinClrLst/>
+    <dgm:txFillClrLst meth="repeat">
+      <a:schemeClr val="dk1"/>
+    </dgm:txFillClrLst>
+    <dgm:txEffectClrLst/>
+  </dgm:styleLbl>
+  <dgm:styleLbl name="bgAccFollowNode1">
+    <dgm:fillClrLst meth="repeat">
+      <a:schemeClr val="accent1">
+        <a:alpha val="90000"/>
+        <a:tint val="40000"/>
+      </a:schemeClr>
+    </dgm:fillClrLst>
+    <dgm:linClrLst meth="repeat">
+      <a:schemeClr val="accent1">
+        <a:alpha val="90000"/>
+        <a:tint val="40000"/>
+      </a:schemeClr>
+    </dgm:linClrLst>
+    <dgm:effectClrLst/>
+    <dgm:txLinClrLst/>
+    <dgm:txFillClrLst meth="repeat">
+      <a:schemeClr val="dk1"/>
+    </dgm:txFillClrLst>
+    <dgm:txEffectClrLst/>
+  </dgm:styleLbl>
+  <dgm:styleLbl name="fgAcc0">
+    <dgm:fillClrLst meth="repeat">
+      <a:schemeClr val="lt1">
+        <a:alpha val="90000"/>
+      </a:schemeClr>
+    </dgm:fillClrLst>
+    <dgm:linClrLst meth="repeat">
+      <a:schemeClr val="accent1"/>
+    </dgm:linClrLst>
+    <dgm:effectClrLst/>
+    <dgm:txLinClrLst/>
+    <dgm:txFillClrLst meth="repeat">
+      <a:schemeClr val="dk1"/>
+    </dgm:txFillClrLst>
+    <dgm:txEffectClrLst/>
+  </dgm:styleLbl>
+  <dgm:styleLbl name="fgAcc2">
+    <dgm:fillClrLst meth="repeat">
+      <a:schemeClr val="lt1">
+        <a:alpha val="90000"/>
+      </a:schemeClr>
+    </dgm:fillClrLst>
+    <dgm:linClrLst meth="repeat">
+      <a:schemeClr val="accent1"/>
+    </dgm:linClrLst>
+    <dgm:effectClrLst/>
+    <dgm:txLinClrLst/>
+    <dgm:txFillClrLst meth="repeat">
+      <a:schemeClr val="dk1"/>
+    </dgm:txFillClrLst>
+    <dgm:txEffectClrLst/>
+  </dgm:styleLbl>
+  <dgm:styleLbl name="fgAcc3">
+    <dgm:fillClrLst meth="repeat">
+      <a:schemeClr val="lt1">
+        <a:alpha val="90000"/>
+      </a:schemeClr>
+    </dgm:fillClrLst>
+    <dgm:linClrLst meth="repeat">
+      <a:schemeClr val="accent1"/>
+    </dgm:linClrLst>
+    <dgm:effectClrLst/>
+    <dgm:txLinClrLst/>
+    <dgm:txFillClrLst meth="repeat">
+      <a:schemeClr val="dk1"/>
+    </dgm:txFillClrLst>
+    <dgm:txEffectClrLst/>
+  </dgm:styleLbl>
+  <dgm:styleLbl name="fgAcc4">
+    <dgm:fillClrLst meth="repeat">
+      <a:schemeClr val="lt1">
+        <a:alpha val="90000"/>
+      </a:schemeClr>
+    </dgm:fillClrLst>
+    <dgm:linClrLst meth="repeat">
+      <a:schemeClr val="accent1"/>
+    </dgm:linClrLst>
+    <dgm:effectClrLst/>
+    <dgm:txLinClrLst/>
+    <dgm:txFillClrLst meth="repeat">
+      <a:schemeClr val="dk1"/>
+    </dgm:txFillClrLst>
+    <dgm:txEffectClrLst/>
+  </dgm:styleLbl>
+  <dgm:styleLbl name="bgShp">
+    <dgm:fillClrLst meth="repeat">
+      <a:schemeClr val="accent1">
+        <a:tint val="40000"/>
+      </a:schemeClr>
+    </dgm:fillClrLst>
+    <dgm:linClrLst meth="repeat">
+      <a:schemeClr val="accent1"/>
+    </dgm:linClrLst>
+    <dgm:effectClrLst/>
+    <dgm:txLinClrLst/>
+    <dgm:txFillClrLst meth="repeat">
+      <a:schemeClr val="dk1"/>
+    </dgm:txFillClrLst>
+    <dgm:txEffectClrLst/>
+  </dgm:styleLbl>
+  <dgm:styleLbl name="dkBgShp">
+    <dgm:fillClrLst meth="repeat">
+      <a:schemeClr val="accent1">
+        <a:shade val="80000"/>
+      </a:schemeClr>
+    </dgm:fillClrLst>
+    <dgm:linClrLst meth="repeat">
+      <a:schemeClr val="accent1"/>
+    </dgm:linClrLst>
+    <dgm:effectClrLst/>
+    <dgm:txLinClrLst/>
+    <dgm:txFillClrLst meth="repeat">
+      <a:schemeClr val="lt1"/>
+    </dgm:txFillClrLst>
+    <dgm:txEffectClrLst/>
+  </dgm:styleLbl>
+  <dgm:styleLbl name="trBgShp">
+    <dgm:fillClrLst meth="repeat">
+      <a:schemeClr val="accent1">
+        <a:tint val="50000"/>
+        <a:alpha val="40000"/>
+      </a:schemeClr>
+    </dgm:fillClrLst>
+    <dgm:linClrLst meth="repeat">
+      <a:schemeClr val="accent1"/>
+    </dgm:linClrLst>
+    <dgm:effectClrLst/>
+    <dgm:txLinClrLst/>
+    <dgm:txFillClrLst meth="repeat">
+      <a:schemeClr val="lt1"/>
+    </dgm:txFillClrLst>
+    <dgm:txEffectClrLst/>
+  </dgm:styleLbl>
+  <dgm:styleLbl name="fgShp">
+    <dgm:fillClrLst meth="repeat">
+      <a:schemeClr val="accent1">
+        <a:tint val="60000"/>
+      </a:schemeClr>
+    </dgm:fillClrLst>
+    <dgm:linClrLst meth="repeat">
+      <a:schemeClr val="lt1"/>
+    </dgm:linClrLst>
+    <dgm:effectClrLst/>
+    <dgm:txLinClrLst/>
+    <dgm:txFillClrLst meth="repeat">
+      <a:schemeClr val="dk1"/>
+    </dgm:txFillClrLst>
+    <dgm:txEffectClrLst/>
+  </dgm:styleLbl>
+  <dgm:styleLbl name="revTx">
+    <dgm:fillClrLst meth="repeat">
+      <a:schemeClr val="lt1">
+        <a:alpha val="0"/>
+      </a:schemeClr>
+    </dgm:fillClrLst>
+    <dgm:linClrLst meth="repeat">
+      <a:schemeClr val="dk1">
+        <a:alpha val="0"/>
+      </a:schemeClr>
+    </dgm:linClrLst>
+    <dgm:effectClrLst/>
+    <dgm:txLinClrLst/>
+    <dgm:txFillClrLst meth="repeat">
+      <a:schemeClr val="tx1"/>
+    </dgm:txFillClrLst>
+    <dgm:txEffectClrLst/>
+  </dgm:styleLbl>
+</dgm:colorsDef>
+</file>
+
+<file path=ppt/diagrams/data1.xml><?xml version="1.0" encoding="utf-8"?>
+<dgm:dataModel xmlns:dgm="http://schemas.openxmlformats.org/drawingml/2006/diagram" xmlns:a="http://schemas.openxmlformats.org/drawingml/2006/main">
+  <dgm:ptLst>
+    <dgm:pt modelId="{F82EA28B-E1C5-4B7B-9567-DEE581E618D3}" type="doc">
+      <dgm:prSet loTypeId="urn:microsoft.com/office/officeart/2005/8/layout/process1" loCatId="process" qsTypeId="urn:microsoft.com/office/officeart/2005/8/quickstyle/simple1" qsCatId="simple" csTypeId="urn:microsoft.com/office/officeart/2005/8/colors/accent1_2" csCatId="accent1" phldr="1"/>
+      <dgm:spPr/>
+      <dgm:t>
+        <a:bodyPr/>
+        <a:lstStyle/>
+        <a:p>
+          <a:endParaRPr lang="fr-FR"/>
+        </a:p>
+      </dgm:t>
+    </dgm:pt>
+    <dgm:pt modelId="{C168408D-F99A-403F-8283-4F4753E139E6}">
+      <dgm:prSet phldrT="[Texte]" phldr="0"/>
+      <dgm:spPr/>
+      <dgm:t>
+        <a:bodyPr/>
+        <a:lstStyle/>
+        <a:p>
+          <a:r>
+            <a:rPr lang="fr-FR" dirty="0"/>
+            <a:t>Split API inputs</a:t>
+          </a:r>
+        </a:p>
+      </dgm:t>
+    </dgm:pt>
+    <dgm:pt modelId="{23FEEEA1-8CC7-4BFF-ACC5-B69735C34294}" type="parTrans" cxnId="{A85B269E-74FA-4765-8CE5-5A75F1AB8686}">
+      <dgm:prSet/>
+      <dgm:spPr/>
+      <dgm:t>
+        <a:bodyPr/>
+        <a:lstStyle/>
+        <a:p>
+          <a:endParaRPr lang="fr-FR"/>
+        </a:p>
+      </dgm:t>
+    </dgm:pt>
+    <dgm:pt modelId="{AC42E2DE-B00B-41E5-9397-50911109AF43}" type="sibTrans" cxnId="{A85B269E-74FA-4765-8CE5-5A75F1AB8686}">
+      <dgm:prSet/>
+      <dgm:spPr/>
+      <dgm:t>
+        <a:bodyPr/>
+        <a:lstStyle/>
+        <a:p>
+          <a:endParaRPr lang="fr-FR"/>
+        </a:p>
+      </dgm:t>
+    </dgm:pt>
+    <dgm:pt modelId="{AE1C3363-FD9E-452A-BD56-5526163416C6}">
+      <dgm:prSet phldrT="[Texte]" phldr="1"/>
+      <dgm:spPr/>
+      <dgm:t>
+        <a:bodyPr/>
+        <a:lstStyle/>
+        <a:p>
+          <a:endParaRPr lang="fr-FR"/>
+        </a:p>
+      </dgm:t>
+    </dgm:pt>
+    <dgm:pt modelId="{BCC81BE5-15A2-4CD3-8A8D-63123FBC7BF1}" type="parTrans" cxnId="{191AB36F-3EFE-4801-8C41-02758F53403A}">
+      <dgm:prSet/>
+      <dgm:spPr/>
+      <dgm:t>
+        <a:bodyPr/>
+        <a:lstStyle/>
+        <a:p>
+          <a:endParaRPr lang="fr-FR"/>
+        </a:p>
+      </dgm:t>
+    </dgm:pt>
+    <dgm:pt modelId="{B3DF1A05-99B6-4A43-B952-B5851DFAEA13}" type="sibTrans" cxnId="{191AB36F-3EFE-4801-8C41-02758F53403A}">
+      <dgm:prSet/>
+      <dgm:spPr/>
+      <dgm:t>
+        <a:bodyPr/>
+        <a:lstStyle/>
+        <a:p>
+          <a:endParaRPr lang="fr-FR"/>
+        </a:p>
+      </dgm:t>
+    </dgm:pt>
+    <dgm:pt modelId="{71C883ED-5876-408A-A6AC-D6D273163716}">
+      <dgm:prSet phldrT="[Texte]" phldr="1"/>
+      <dgm:spPr/>
+      <dgm:t>
+        <a:bodyPr/>
+        <a:lstStyle/>
+        <a:p>
+          <a:endParaRPr lang="fr-FR"/>
+        </a:p>
+      </dgm:t>
+    </dgm:pt>
+    <dgm:pt modelId="{63360257-8E98-452B-8523-306DBDACCF45}" type="parTrans" cxnId="{43508B86-3AC3-46EF-850A-F427CF3A7276}">
+      <dgm:prSet/>
+      <dgm:spPr/>
+      <dgm:t>
+        <a:bodyPr/>
+        <a:lstStyle/>
+        <a:p>
+          <a:endParaRPr lang="fr-FR"/>
+        </a:p>
+      </dgm:t>
+    </dgm:pt>
+    <dgm:pt modelId="{373B8BFE-C4C8-4EC6-84D4-86FFD71C7035}" type="sibTrans" cxnId="{43508B86-3AC3-46EF-850A-F427CF3A7276}">
+      <dgm:prSet/>
+      <dgm:spPr/>
+      <dgm:t>
+        <a:bodyPr/>
+        <a:lstStyle/>
+        <a:p>
+          <a:endParaRPr lang="fr-FR"/>
+        </a:p>
+      </dgm:t>
+    </dgm:pt>
+    <dgm:pt modelId="{18289538-8523-447A-81B5-5737D4439D35}" type="pres">
+      <dgm:prSet presAssocID="{F82EA28B-E1C5-4B7B-9567-DEE581E618D3}" presName="Name0" presStyleCnt="0">
+        <dgm:presLayoutVars>
+          <dgm:dir/>
+          <dgm:resizeHandles val="exact"/>
+        </dgm:presLayoutVars>
+      </dgm:prSet>
+      <dgm:spPr/>
+    </dgm:pt>
+    <dgm:pt modelId="{587054B0-2809-4AC3-A8D1-E1A6A0F3492A}" type="pres">
+      <dgm:prSet presAssocID="{C168408D-F99A-403F-8283-4F4753E139E6}" presName="node" presStyleLbl="node1" presStyleIdx="0" presStyleCnt="3">
+        <dgm:presLayoutVars>
+          <dgm:bulletEnabled val="1"/>
+        </dgm:presLayoutVars>
+      </dgm:prSet>
+      <dgm:spPr/>
+    </dgm:pt>
+    <dgm:pt modelId="{E9DDB663-A194-4921-B3C0-C5B494DC5DBE}" type="pres">
+      <dgm:prSet presAssocID="{AC42E2DE-B00B-41E5-9397-50911109AF43}" presName="sibTrans" presStyleLbl="sibTrans2D1" presStyleIdx="0" presStyleCnt="2"/>
+      <dgm:spPr/>
+    </dgm:pt>
+    <dgm:pt modelId="{55FA430B-BE5A-4176-83BE-E9B4108F44E3}" type="pres">
+      <dgm:prSet presAssocID="{AC42E2DE-B00B-41E5-9397-50911109AF43}" presName="connectorText" presStyleLbl="sibTrans2D1" presStyleIdx="0" presStyleCnt="2"/>
+      <dgm:spPr/>
+    </dgm:pt>
+    <dgm:pt modelId="{5B92966F-A06B-45CD-AD4B-ADD14077C3A5}" type="pres">
+      <dgm:prSet presAssocID="{AE1C3363-FD9E-452A-BD56-5526163416C6}" presName="node" presStyleLbl="node1" presStyleIdx="1" presStyleCnt="3">
+        <dgm:presLayoutVars>
+          <dgm:bulletEnabled val="1"/>
+        </dgm:presLayoutVars>
+      </dgm:prSet>
+      <dgm:spPr/>
+    </dgm:pt>
+    <dgm:pt modelId="{3E7D6861-2F51-4567-B213-FB96FBCC2BB7}" type="pres">
+      <dgm:prSet presAssocID="{B3DF1A05-99B6-4A43-B952-B5851DFAEA13}" presName="sibTrans" presStyleLbl="sibTrans2D1" presStyleIdx="1" presStyleCnt="2"/>
+      <dgm:spPr/>
+    </dgm:pt>
+    <dgm:pt modelId="{80D2F632-6F5B-40B9-8C02-6DB5681010B6}" type="pres">
+      <dgm:prSet presAssocID="{B3DF1A05-99B6-4A43-B952-B5851DFAEA13}" presName="connectorText" presStyleLbl="sibTrans2D1" presStyleIdx="1" presStyleCnt="2"/>
+      <dgm:spPr/>
+    </dgm:pt>
+    <dgm:pt modelId="{75FF1649-CEEA-4EA9-9C74-BCD2AA9B44E7}" type="pres">
+      <dgm:prSet presAssocID="{71C883ED-5876-408A-A6AC-D6D273163716}" presName="node" presStyleLbl="node1" presStyleIdx="2" presStyleCnt="3">
+        <dgm:presLayoutVars>
+          <dgm:bulletEnabled val="1"/>
+        </dgm:presLayoutVars>
+      </dgm:prSet>
+      <dgm:spPr/>
+    </dgm:pt>
+  </dgm:ptLst>
+  <dgm:cxnLst>
+    <dgm:cxn modelId="{6BD5BF45-F4EE-4D80-851C-0C6EE64B6E24}" type="presOf" srcId="{B3DF1A05-99B6-4A43-B952-B5851DFAEA13}" destId="{80D2F632-6F5B-40B9-8C02-6DB5681010B6}" srcOrd="1" destOrd="0" presId="urn:microsoft.com/office/officeart/2005/8/layout/process1"/>
+    <dgm:cxn modelId="{A149734C-49BA-4391-B64A-6DDDDD02C83A}" type="presOf" srcId="{AC42E2DE-B00B-41E5-9397-50911109AF43}" destId="{E9DDB663-A194-4921-B3C0-C5B494DC5DBE}" srcOrd="0" destOrd="0" presId="urn:microsoft.com/office/officeart/2005/8/layout/process1"/>
+    <dgm:cxn modelId="{191AB36F-3EFE-4801-8C41-02758F53403A}" srcId="{F82EA28B-E1C5-4B7B-9567-DEE581E618D3}" destId="{AE1C3363-FD9E-452A-BD56-5526163416C6}" srcOrd="1" destOrd="0" parTransId="{BCC81BE5-15A2-4CD3-8A8D-63123FBC7BF1}" sibTransId="{B3DF1A05-99B6-4A43-B952-B5851DFAEA13}"/>
+    <dgm:cxn modelId="{A9483957-9265-4952-9C55-B2395715C517}" type="presOf" srcId="{AE1C3363-FD9E-452A-BD56-5526163416C6}" destId="{5B92966F-A06B-45CD-AD4B-ADD14077C3A5}" srcOrd="0" destOrd="0" presId="urn:microsoft.com/office/officeart/2005/8/layout/process1"/>
+    <dgm:cxn modelId="{43508B86-3AC3-46EF-850A-F427CF3A7276}" srcId="{F82EA28B-E1C5-4B7B-9567-DEE581E618D3}" destId="{71C883ED-5876-408A-A6AC-D6D273163716}" srcOrd="2" destOrd="0" parTransId="{63360257-8E98-452B-8523-306DBDACCF45}" sibTransId="{373B8BFE-C4C8-4EC6-84D4-86FFD71C7035}"/>
+    <dgm:cxn modelId="{A85B269E-74FA-4765-8CE5-5A75F1AB8686}" srcId="{F82EA28B-E1C5-4B7B-9567-DEE581E618D3}" destId="{C168408D-F99A-403F-8283-4F4753E139E6}" srcOrd="0" destOrd="0" parTransId="{23FEEEA1-8CC7-4BFF-ACC5-B69735C34294}" sibTransId="{AC42E2DE-B00B-41E5-9397-50911109AF43}"/>
+    <dgm:cxn modelId="{BE0148C9-58D1-4049-A427-6F75863B01B4}" type="presOf" srcId="{B3DF1A05-99B6-4A43-B952-B5851DFAEA13}" destId="{3E7D6861-2F51-4567-B213-FB96FBCC2BB7}" srcOrd="0" destOrd="0" presId="urn:microsoft.com/office/officeart/2005/8/layout/process1"/>
+    <dgm:cxn modelId="{DDF4CDCD-669F-4C18-88D6-6383E62DDF7F}" type="presOf" srcId="{AC42E2DE-B00B-41E5-9397-50911109AF43}" destId="{55FA430B-BE5A-4176-83BE-E9B4108F44E3}" srcOrd="1" destOrd="0" presId="urn:microsoft.com/office/officeart/2005/8/layout/process1"/>
+    <dgm:cxn modelId="{6711A1D4-9314-4B4A-A893-3A7FFBBA63DE}" type="presOf" srcId="{F82EA28B-E1C5-4B7B-9567-DEE581E618D3}" destId="{18289538-8523-447A-81B5-5737D4439D35}" srcOrd="0" destOrd="0" presId="urn:microsoft.com/office/officeart/2005/8/layout/process1"/>
+    <dgm:cxn modelId="{6108FEEA-AF01-4640-B0AF-C31642586FD7}" type="presOf" srcId="{71C883ED-5876-408A-A6AC-D6D273163716}" destId="{75FF1649-CEEA-4EA9-9C74-BCD2AA9B44E7}" srcOrd="0" destOrd="0" presId="urn:microsoft.com/office/officeart/2005/8/layout/process1"/>
+    <dgm:cxn modelId="{53354CFE-42E5-47B1-88E1-ADA27CD64073}" type="presOf" srcId="{C168408D-F99A-403F-8283-4F4753E139E6}" destId="{587054B0-2809-4AC3-A8D1-E1A6A0F3492A}" srcOrd="0" destOrd="0" presId="urn:microsoft.com/office/officeart/2005/8/layout/process1"/>
+    <dgm:cxn modelId="{272E78E4-3998-4D47-B16B-D23228E2F17F}" type="presParOf" srcId="{18289538-8523-447A-81B5-5737D4439D35}" destId="{587054B0-2809-4AC3-A8D1-E1A6A0F3492A}" srcOrd="0" destOrd="0" presId="urn:microsoft.com/office/officeart/2005/8/layout/process1"/>
+    <dgm:cxn modelId="{D5DDA85D-6C91-4E01-904B-347AF70CAE38}" type="presParOf" srcId="{18289538-8523-447A-81B5-5737D4439D35}" destId="{E9DDB663-A194-4921-B3C0-C5B494DC5DBE}" srcOrd="1" destOrd="0" presId="urn:microsoft.com/office/officeart/2005/8/layout/process1"/>
+    <dgm:cxn modelId="{E1E64269-E7A8-4E48-BB55-A0D05CAF99CD}" type="presParOf" srcId="{E9DDB663-A194-4921-B3C0-C5B494DC5DBE}" destId="{55FA430B-BE5A-4176-83BE-E9B4108F44E3}" srcOrd="0" destOrd="0" presId="urn:microsoft.com/office/officeart/2005/8/layout/process1"/>
+    <dgm:cxn modelId="{82C43649-C577-4C11-B9F7-81C229CBEFB1}" type="presParOf" srcId="{18289538-8523-447A-81B5-5737D4439D35}" destId="{5B92966F-A06B-45CD-AD4B-ADD14077C3A5}" srcOrd="2" destOrd="0" presId="urn:microsoft.com/office/officeart/2005/8/layout/process1"/>
+    <dgm:cxn modelId="{5216FF71-362C-4234-A7D0-140809859566}" type="presParOf" srcId="{18289538-8523-447A-81B5-5737D4439D35}" destId="{3E7D6861-2F51-4567-B213-FB96FBCC2BB7}" srcOrd="3" destOrd="0" presId="urn:microsoft.com/office/officeart/2005/8/layout/process1"/>
+    <dgm:cxn modelId="{109E356F-C7C2-442A-BC23-76F9E103808A}" type="presParOf" srcId="{3E7D6861-2F51-4567-B213-FB96FBCC2BB7}" destId="{80D2F632-6F5B-40B9-8C02-6DB5681010B6}" srcOrd="0" destOrd="0" presId="urn:microsoft.com/office/officeart/2005/8/layout/process1"/>
+    <dgm:cxn modelId="{5A6FF1A8-39DB-409C-AA12-CFC44868E1D9}" type="presParOf" srcId="{18289538-8523-447A-81B5-5737D4439D35}" destId="{75FF1649-CEEA-4EA9-9C74-BCD2AA9B44E7}" srcOrd="4" destOrd="0" presId="urn:microsoft.com/office/officeart/2005/8/layout/process1"/>
+  </dgm:cxnLst>
+  <dgm:bg/>
+  <dgm:whole/>
+  <dgm:extLst>
+    <a:ext uri="http://schemas.microsoft.com/office/drawing/2008/diagram">
+      <dsp:dataModelExt xmlns:dsp="http://schemas.microsoft.com/office/drawing/2008/diagram" relId="rId6" minVer="http://schemas.openxmlformats.org/drawingml/2006/diagram"/>
+    </a:ext>
+  </dgm:extLst>
+</dgm:dataModel>
+</file>
+
+<file path=ppt/diagrams/drawing1.xml><?xml version="1.0" encoding="utf-8"?>
+<dsp:drawing xmlns:dgm="http://schemas.openxmlformats.org/drawingml/2006/diagram" xmlns:dsp="http://schemas.microsoft.com/office/drawing/2008/diagram" xmlns:a="http://schemas.openxmlformats.org/drawingml/2006/main">
+  <dsp:spTree>
+    <dsp:nvGrpSpPr>
+      <dsp:cNvPr id="0" name=""/>
+      <dsp:cNvGrpSpPr/>
+    </dsp:nvGrpSpPr>
+    <dsp:grpSpPr/>
+    <dsp:sp modelId="{587054B0-2809-4AC3-A8D1-E1A6A0F3492A}">
+      <dsp:nvSpPr>
+        <dsp:cNvPr id="0" name=""/>
+        <dsp:cNvSpPr/>
+      </dsp:nvSpPr>
+      <dsp:spPr>
+        <a:xfrm>
+          <a:off x="7143" y="2068777"/>
+          <a:ext cx="2135187" cy="1281112"/>
+        </a:xfrm>
+        <a:prstGeom prst="roundRect">
+          <a:avLst>
+            <a:gd name="adj" fmla="val 10000"/>
+          </a:avLst>
+        </a:prstGeom>
+        <a:solidFill>
+          <a:schemeClr val="accent1">
+            <a:hueOff val="0"/>
+            <a:satOff val="0"/>
+            <a:lumOff val="0"/>
+            <a:alphaOff val="0"/>
+          </a:schemeClr>
+        </a:solidFill>
+        <a:ln w="19050" cap="flat" cmpd="sng" algn="ctr">
+          <a:solidFill>
+            <a:schemeClr val="lt1">
+              <a:hueOff val="0"/>
+              <a:satOff val="0"/>
+              <a:lumOff val="0"/>
+              <a:alphaOff val="0"/>
+            </a:schemeClr>
+          </a:solidFill>
+          <a:prstDash val="solid"/>
+          <a:miter lim="800000"/>
+        </a:ln>
+        <a:effectLst/>
+      </dsp:spPr>
+      <dsp:style>
+        <a:lnRef idx="2">
+          <a:scrgbClr r="0" g="0" b="0"/>
+        </a:lnRef>
+        <a:fillRef idx="1">
+          <a:scrgbClr r="0" g="0" b="0"/>
+        </a:fillRef>
+        <a:effectRef idx="0">
+          <a:scrgbClr r="0" g="0" b="0"/>
+        </a:effectRef>
+        <a:fontRef idx="minor">
+          <a:schemeClr val="lt1"/>
+        </a:fontRef>
+      </dsp:style>
+      <dsp:txBody>
+        <a:bodyPr spcFirstLastPara="0" vert="horz" wrap="square" lIns="125730" tIns="125730" rIns="125730" bIns="125730" numCol="1" spcCol="1270" anchor="ctr" anchorCtr="0">
+          <a:noAutofit/>
+        </a:bodyPr>
+        <a:lstStyle/>
+        <a:p>
+          <a:pPr marL="0" lvl="0" indent="0" algn="ctr" defTabSz="1466850">
+            <a:lnSpc>
+              <a:spcPct val="90000"/>
+            </a:lnSpc>
+            <a:spcBef>
+              <a:spcPct val="0"/>
+            </a:spcBef>
+            <a:spcAft>
+              <a:spcPct val="35000"/>
+            </a:spcAft>
+            <a:buNone/>
+          </a:pPr>
+          <a:r>
+            <a:rPr lang="fr-FR" sz="3300" kern="1200" dirty="0"/>
+            <a:t>Split API inputs</a:t>
+          </a:r>
+        </a:p>
+      </dsp:txBody>
+      <dsp:txXfrm>
+        <a:off x="44665" y="2106299"/>
+        <a:ext cx="2060143" cy="1206068"/>
+      </dsp:txXfrm>
+    </dsp:sp>
+    <dsp:sp modelId="{E9DDB663-A194-4921-B3C0-C5B494DC5DBE}">
+      <dsp:nvSpPr>
+        <dsp:cNvPr id="0" name=""/>
+        <dsp:cNvSpPr/>
+      </dsp:nvSpPr>
+      <dsp:spPr>
+        <a:xfrm>
+          <a:off x="2355850" y="2444570"/>
+          <a:ext cx="452659" cy="529526"/>
+        </a:xfrm>
+        <a:prstGeom prst="rightArrow">
+          <a:avLst>
+            <a:gd name="adj1" fmla="val 60000"/>
+            <a:gd name="adj2" fmla="val 50000"/>
+          </a:avLst>
+        </a:prstGeom>
+        <a:solidFill>
+          <a:schemeClr val="accent1">
+            <a:tint val="60000"/>
+            <a:hueOff val="0"/>
+            <a:satOff val="0"/>
+            <a:lumOff val="0"/>
+            <a:alphaOff val="0"/>
+          </a:schemeClr>
+        </a:solidFill>
+        <a:ln>
+          <a:noFill/>
+        </a:ln>
+        <a:effectLst/>
+      </dsp:spPr>
+      <dsp:style>
+        <a:lnRef idx="0">
+          <a:scrgbClr r="0" g="0" b="0"/>
+        </a:lnRef>
+        <a:fillRef idx="1">
+          <a:scrgbClr r="0" g="0" b="0"/>
+        </a:fillRef>
+        <a:effectRef idx="0">
+          <a:scrgbClr r="0" g="0" b="0"/>
+        </a:effectRef>
+        <a:fontRef idx="minor">
+          <a:schemeClr val="lt1"/>
+        </a:fontRef>
+      </dsp:style>
+      <dsp:txBody>
+        <a:bodyPr spcFirstLastPara="0" vert="horz" wrap="square" lIns="0" tIns="0" rIns="0" bIns="0" numCol="1" spcCol="1270" anchor="ctr" anchorCtr="0">
+          <a:noAutofit/>
+        </a:bodyPr>
+        <a:lstStyle/>
+        <a:p>
+          <a:pPr marL="0" lvl="0" indent="0" algn="ctr" defTabSz="977900">
+            <a:lnSpc>
+              <a:spcPct val="90000"/>
+            </a:lnSpc>
+            <a:spcBef>
+              <a:spcPct val="0"/>
+            </a:spcBef>
+            <a:spcAft>
+              <a:spcPct val="35000"/>
+            </a:spcAft>
+            <a:buNone/>
+          </a:pPr>
+          <a:endParaRPr lang="fr-FR" sz="2200" kern="1200"/>
+        </a:p>
+      </dsp:txBody>
+      <dsp:txXfrm>
+        <a:off x="2355850" y="2550475"/>
+        <a:ext cx="316861" cy="317716"/>
+      </dsp:txXfrm>
+    </dsp:sp>
+    <dsp:sp modelId="{5B92966F-A06B-45CD-AD4B-ADD14077C3A5}">
+      <dsp:nvSpPr>
+        <dsp:cNvPr id="0" name=""/>
+        <dsp:cNvSpPr/>
+      </dsp:nvSpPr>
+      <dsp:spPr>
+        <a:xfrm>
+          <a:off x="2996406" y="2068777"/>
+          <a:ext cx="2135187" cy="1281112"/>
+        </a:xfrm>
+        <a:prstGeom prst="roundRect">
+          <a:avLst>
+            <a:gd name="adj" fmla="val 10000"/>
+          </a:avLst>
+        </a:prstGeom>
+        <a:solidFill>
+          <a:schemeClr val="accent1">
+            <a:hueOff val="0"/>
+            <a:satOff val="0"/>
+            <a:lumOff val="0"/>
+            <a:alphaOff val="0"/>
+          </a:schemeClr>
+        </a:solidFill>
+        <a:ln w="19050" cap="flat" cmpd="sng" algn="ctr">
+          <a:solidFill>
+            <a:schemeClr val="lt1">
+              <a:hueOff val="0"/>
+              <a:satOff val="0"/>
+              <a:lumOff val="0"/>
+              <a:alphaOff val="0"/>
+            </a:schemeClr>
+          </a:solidFill>
+          <a:prstDash val="solid"/>
+          <a:miter lim="800000"/>
+        </a:ln>
+        <a:effectLst/>
+      </dsp:spPr>
+      <dsp:style>
+        <a:lnRef idx="2">
+          <a:scrgbClr r="0" g="0" b="0"/>
+        </a:lnRef>
+        <a:fillRef idx="1">
+          <a:scrgbClr r="0" g="0" b="0"/>
+        </a:fillRef>
+        <a:effectRef idx="0">
+          <a:scrgbClr r="0" g="0" b="0"/>
+        </a:effectRef>
+        <a:fontRef idx="minor">
+          <a:schemeClr val="lt1"/>
+        </a:fontRef>
+      </dsp:style>
+      <dsp:txBody>
+        <a:bodyPr spcFirstLastPara="0" vert="horz" wrap="square" lIns="125730" tIns="125730" rIns="125730" bIns="125730" numCol="1" spcCol="1270" anchor="ctr" anchorCtr="0">
+          <a:noAutofit/>
+        </a:bodyPr>
+        <a:lstStyle/>
+        <a:p>
+          <a:pPr marL="0" lvl="0" indent="0" algn="ctr" defTabSz="1466850">
+            <a:lnSpc>
+              <a:spcPct val="90000"/>
+            </a:lnSpc>
+            <a:spcBef>
+              <a:spcPct val="0"/>
+            </a:spcBef>
+            <a:spcAft>
+              <a:spcPct val="35000"/>
+            </a:spcAft>
+            <a:buNone/>
+          </a:pPr>
+          <a:endParaRPr lang="fr-FR" sz="3300" kern="1200"/>
+        </a:p>
+      </dsp:txBody>
+      <dsp:txXfrm>
+        <a:off x="3033928" y="2106299"/>
+        <a:ext cx="2060143" cy="1206068"/>
+      </dsp:txXfrm>
+    </dsp:sp>
+    <dsp:sp modelId="{3E7D6861-2F51-4567-B213-FB96FBCC2BB7}">
+      <dsp:nvSpPr>
+        <dsp:cNvPr id="0" name=""/>
+        <dsp:cNvSpPr/>
+      </dsp:nvSpPr>
+      <dsp:spPr>
+        <a:xfrm>
+          <a:off x="5345112" y="2444570"/>
+          <a:ext cx="452659" cy="529526"/>
+        </a:xfrm>
+        <a:prstGeom prst="rightArrow">
+          <a:avLst>
+            <a:gd name="adj1" fmla="val 60000"/>
+            <a:gd name="adj2" fmla="val 50000"/>
+          </a:avLst>
+        </a:prstGeom>
+        <a:solidFill>
+          <a:schemeClr val="accent1">
+            <a:tint val="60000"/>
+            <a:hueOff val="0"/>
+            <a:satOff val="0"/>
+            <a:lumOff val="0"/>
+            <a:alphaOff val="0"/>
+          </a:schemeClr>
+        </a:solidFill>
+        <a:ln>
+          <a:noFill/>
+        </a:ln>
+        <a:effectLst/>
+      </dsp:spPr>
+      <dsp:style>
+        <a:lnRef idx="0">
+          <a:scrgbClr r="0" g="0" b="0"/>
+        </a:lnRef>
+        <a:fillRef idx="1">
+          <a:scrgbClr r="0" g="0" b="0"/>
+        </a:fillRef>
+        <a:effectRef idx="0">
+          <a:scrgbClr r="0" g="0" b="0"/>
+        </a:effectRef>
+        <a:fontRef idx="minor">
+          <a:schemeClr val="lt1"/>
+        </a:fontRef>
+      </dsp:style>
+      <dsp:txBody>
+        <a:bodyPr spcFirstLastPara="0" vert="horz" wrap="square" lIns="0" tIns="0" rIns="0" bIns="0" numCol="1" spcCol="1270" anchor="ctr" anchorCtr="0">
+          <a:noAutofit/>
+        </a:bodyPr>
+        <a:lstStyle/>
+        <a:p>
+          <a:pPr marL="0" lvl="0" indent="0" algn="ctr" defTabSz="977900">
+            <a:lnSpc>
+              <a:spcPct val="90000"/>
+            </a:lnSpc>
+            <a:spcBef>
+              <a:spcPct val="0"/>
+            </a:spcBef>
+            <a:spcAft>
+              <a:spcPct val="35000"/>
+            </a:spcAft>
+            <a:buNone/>
+          </a:pPr>
+          <a:endParaRPr lang="fr-FR" sz="2200" kern="1200"/>
+        </a:p>
+      </dsp:txBody>
+      <dsp:txXfrm>
+        <a:off x="5345112" y="2550475"/>
+        <a:ext cx="316861" cy="317716"/>
+      </dsp:txXfrm>
+    </dsp:sp>
+    <dsp:sp modelId="{75FF1649-CEEA-4EA9-9C74-BCD2AA9B44E7}">
+      <dsp:nvSpPr>
+        <dsp:cNvPr id="0" name=""/>
+        <dsp:cNvSpPr/>
+      </dsp:nvSpPr>
+      <dsp:spPr>
+        <a:xfrm>
+          <a:off x="5985668" y="2068777"/>
+          <a:ext cx="2135187" cy="1281112"/>
+        </a:xfrm>
+        <a:prstGeom prst="roundRect">
+          <a:avLst>
+            <a:gd name="adj" fmla="val 10000"/>
+          </a:avLst>
+        </a:prstGeom>
+        <a:solidFill>
+          <a:schemeClr val="accent1">
+            <a:hueOff val="0"/>
+            <a:satOff val="0"/>
+            <a:lumOff val="0"/>
+            <a:alphaOff val="0"/>
+          </a:schemeClr>
+        </a:solidFill>
+        <a:ln w="19050" cap="flat" cmpd="sng" algn="ctr">
+          <a:solidFill>
+            <a:schemeClr val="lt1">
+              <a:hueOff val="0"/>
+              <a:satOff val="0"/>
+              <a:lumOff val="0"/>
+              <a:alphaOff val="0"/>
+            </a:schemeClr>
+          </a:solidFill>
+          <a:prstDash val="solid"/>
+          <a:miter lim="800000"/>
+        </a:ln>
+        <a:effectLst/>
+      </dsp:spPr>
+      <dsp:style>
+        <a:lnRef idx="2">
+          <a:scrgbClr r="0" g="0" b="0"/>
+        </a:lnRef>
+        <a:fillRef idx="1">
+          <a:scrgbClr r="0" g="0" b="0"/>
+        </a:fillRef>
+        <a:effectRef idx="0">
+          <a:scrgbClr r="0" g="0" b="0"/>
+        </a:effectRef>
+        <a:fontRef idx="minor">
+          <a:schemeClr val="lt1"/>
+        </a:fontRef>
+      </dsp:style>
+      <dsp:txBody>
+        <a:bodyPr spcFirstLastPara="0" vert="horz" wrap="square" lIns="125730" tIns="125730" rIns="125730" bIns="125730" numCol="1" spcCol="1270" anchor="ctr" anchorCtr="0">
+          <a:noAutofit/>
+        </a:bodyPr>
+        <a:lstStyle/>
+        <a:p>
+          <a:pPr marL="0" lvl="0" indent="0" algn="ctr" defTabSz="1466850">
+            <a:lnSpc>
+              <a:spcPct val="90000"/>
+            </a:lnSpc>
+            <a:spcBef>
+              <a:spcPct val="0"/>
+            </a:spcBef>
+            <a:spcAft>
+              <a:spcPct val="35000"/>
+            </a:spcAft>
+            <a:buNone/>
+          </a:pPr>
+          <a:endParaRPr lang="fr-FR" sz="3300" kern="1200"/>
+        </a:p>
+      </dsp:txBody>
+      <dsp:txXfrm>
+        <a:off x="6023190" y="2106299"/>
+        <a:ext cx="2060143" cy="1206068"/>
+      </dsp:txXfrm>
+    </dsp:sp>
+  </dsp:spTree>
+</dsp:drawing>
+</file>
+
+<file path=ppt/diagrams/layout1.xml><?xml version="1.0" encoding="utf-8"?>
+<dgm:layoutDef xmlns:dgm="http://schemas.openxmlformats.org/drawingml/2006/diagram" xmlns:a="http://schemas.openxmlformats.org/drawingml/2006/main" uniqueId="urn:microsoft.com/office/officeart/2005/8/layout/process1">
+  <dgm:title val=""/>
+  <dgm:desc val=""/>
+  <dgm:catLst>
+    <dgm:cat type="process" pri="1000"/>
+    <dgm:cat type="convert" pri="15000"/>
+  </dgm:catLst>
+  <dgm:sampData useDef="1">
+    <dgm:dataModel>
+      <dgm:ptLst/>
+      <dgm:bg/>
+      <dgm:whole/>
+    </dgm:dataModel>
+  </dgm:sampData>
+  <dgm:styleData>
+    <dgm:dataModel>
+      <dgm:ptLst>
+        <dgm:pt modelId="0" type="doc"/>
+        <dgm:pt modelId="1"/>
+        <dgm:pt modelId="2"/>
+      </dgm:ptLst>
+      <dgm:cxnLst>
+        <dgm:cxn modelId="3" srcId="0" destId="1" srcOrd="0" destOrd="0"/>
+        <dgm:cxn modelId="4" srcId="0" destId="2" srcOrd="1" destOrd="0"/>
+      </dgm:cxnLst>
+      <dgm:bg/>
+      <dgm:whole/>
+    </dgm:dataModel>
+  </dgm:styleData>
+  <dgm:clrData>
+    <dgm:dataModel>
+      <dgm:ptLst>
+        <dgm:pt modelId="0" type="doc"/>
+        <dgm:pt modelId="1"/>
+        <dgm:pt modelId="2"/>
+        <dgm:pt modelId="3"/>
+        <dgm:pt modelId="4"/>
+      </dgm:ptLst>
+      <dgm:cxnLst>
+        <dgm:cxn modelId="5" srcId="0" destId="1" srcOrd="0" destOrd="0"/>
+        <dgm:cxn modelId="6" srcId="0" destId="2" srcOrd="1" destOrd="0"/>
+        <dgm:cxn modelId="7" srcId="0" destId="3" srcOrd="2" destOrd="0"/>
+        <dgm:cxn modelId="8" srcId="0" destId="4" srcOrd="3" destOrd="0"/>
+      </dgm:cxnLst>
+      <dgm:bg/>
+      <dgm:whole/>
+    </dgm:dataModel>
+  </dgm:clrData>
+  <dgm:layoutNode name="Name0">
+    <dgm:varLst>
+      <dgm:dir/>
+      <dgm:resizeHandles val="exact"/>
+    </dgm:varLst>
+    <dgm:choose name="Name1">
+      <dgm:if name="Name2" func="var" arg="dir" op="equ" val="norm">
+        <dgm:alg type="lin"/>
+      </dgm:if>
+      <dgm:else name="Name3">
+        <dgm:alg type="lin">
+          <dgm:param type="linDir" val="fromR"/>
+        </dgm:alg>
+      </dgm:else>
+    </dgm:choose>
+    <dgm:shape xmlns:r="http://schemas.openxmlformats.org/officeDocument/2006/relationships" r:blip="">
+      <dgm:adjLst/>
+    </dgm:shape>
+    <dgm:presOf/>
+    <dgm:constrLst>
+      <dgm:constr type="w" for="ch" ptType="node" refType="w"/>
+      <dgm:constr type="h" for="ch" ptType="node" op="equ"/>
+      <dgm:constr type="primFontSz" for="ch" ptType="node" op="equ" val="65"/>
+      <dgm:constr type="w" for="ch" ptType="sibTrans" refType="w" refFor="ch" refPtType="node" op="equ" fact="0.4"/>
+      <dgm:constr type="h" for="ch" ptType="sibTrans" op="equ"/>
+      <dgm:constr type="primFontSz" for="des" forName="connectorText" op="equ" val="55"/>
+      <dgm:constr type="primFontSz" for="des" forName="connectorText" refType="primFontSz" refFor="ch" refPtType="node" op="lte" fact="0.8"/>
+    </dgm:constrLst>
+    <dgm:ruleLst/>
+    <dgm:forEach name="nodesForEach" axis="ch" ptType="node">
+      <dgm:layoutNode name="node">
+        <dgm:varLst>
+          <dgm:bulletEnabled val="1"/>
+        </dgm:varLst>
+        <dgm:alg type="tx"/>
+        <dgm:shape xmlns:r="http://schemas.openxmlformats.org/officeDocument/2006/relationships" type="roundRect" r:blip="">
+          <dgm:adjLst>
+            <dgm:adj idx="1" val="0.1"/>
+          </dgm:adjLst>
+        </dgm:shape>
+        <dgm:presOf axis="desOrSelf" ptType="node"/>
+        <dgm:constrLst>
+          <dgm:constr type="h" refType="w" fact="0.6"/>
+          <dgm:constr type="tMarg" refType="primFontSz" fact="0.3"/>
+          <dgm:constr type="bMarg" refType="primFontSz" fact="0.3"/>
+          <dgm:constr type="lMarg" refType="primFontSz" fact="0.3"/>
+          <dgm:constr type="rMarg" refType="primFontSz" fact="0.3"/>
+        </dgm:constrLst>
+        <dgm:ruleLst>
+          <dgm:rule type="primFontSz" val="18" fact="NaN" max="NaN"/>
+          <dgm:rule type="h" val="NaN" fact="1.5" max="NaN"/>
+          <dgm:rule type="primFontSz" val="5" fact="NaN" max="NaN"/>
+          <dgm:rule type="h" val="INF" fact="NaN" max="NaN"/>
+        </dgm:ruleLst>
+      </dgm:layoutNode>
+      <dgm:forEach name="sibTransForEach" axis="followSib" ptType="sibTrans" cnt="1">
+        <dgm:layoutNode name="sibTrans">
+          <dgm:alg type="conn">
+            <dgm:param type="begPts" val="auto"/>
+            <dgm:param type="endPts" val="auto"/>
+          </dgm:alg>
+          <dgm:shape xmlns:r="http://schemas.openxmlformats.org/officeDocument/2006/relationships" type="conn" r:blip="">
+            <dgm:adjLst/>
+          </dgm:shape>
+          <dgm:presOf axis="self"/>
+          <dgm:constrLst>
+            <dgm:constr type="h" refType="w" fact="0.62"/>
+            <dgm:constr type="connDist"/>
+            <dgm:constr type="begPad" refType="connDist" fact="0.25"/>
+            <dgm:constr type="endPad" refType="connDist" fact="0.22"/>
+          </dgm:constrLst>
+          <dgm:ruleLst/>
+          <dgm:layoutNode name="connectorText">
+            <dgm:alg type="tx">
+              <dgm:param type="autoTxRot" val="grav"/>
+            </dgm:alg>
+            <dgm:shape xmlns:r="http://schemas.openxmlformats.org/officeDocument/2006/relationships" type="conn" r:blip="" hideGeom="1">
+              <dgm:adjLst/>
+            </dgm:shape>
+            <dgm:presOf axis="self"/>
+            <dgm:constrLst>
+              <dgm:constr type="lMarg"/>
+              <dgm:constr type="rMarg"/>
+              <dgm:constr type="tMarg"/>
+              <dgm:constr type="bMarg"/>
+            </dgm:constrLst>
+            <dgm:ruleLst>
+              <dgm:rule type="primFontSz" val="5" fact="NaN" max="NaN"/>
+            </dgm:ruleLst>
+          </dgm:layoutNode>
+        </dgm:layoutNode>
+      </dgm:forEach>
+    </dgm:forEach>
+  </dgm:layoutNode>
+</dgm:layoutDef>
+</file>
+
+<file path=ppt/diagrams/quickStyle1.xml><?xml version="1.0" encoding="utf-8"?>
+<dgm:styleDef xmlns:dgm="http://schemas.openxmlformats.org/drawingml/2006/diagram" xmlns:a="http://schemas.openxmlformats.org/drawingml/2006/main" uniqueId="urn:microsoft.com/office/officeart/2005/8/quickstyle/simple1">
+  <dgm:title val=""/>
+  <dgm:desc val=""/>
+  <dgm:catLst>
+    <dgm:cat type="simple" pri="10100"/>
+  </dgm:catLst>
+  <dgm:scene3d>
+    <a:camera prst="orthographicFront"/>
+    <a:lightRig rig="threePt" dir="t"/>
+  </dgm:scene3d>
+  <dgm:styleLbl name="node0">
+    <dgm:scene3d>
+      <a:camera prst="orthographicFront"/>
+      <a:lightRig rig="threePt" dir="t"/>
+    </dgm:scene3d>
+    <dgm:sp3d/>
+    <dgm:txPr/>
+    <dgm:style>
+      <a:lnRef idx="2">
+        <a:scrgbClr r="0" g="0" b="0"/>
+      </a:lnRef>
+      <a:fillRef idx="1">
+        <a:scrgbClr r="0" g="0" b="0"/>
+      </a:fillRef>
+      <a:effectRef idx="0">
+        <a:scrgbClr r="0" g="0" b="0"/>
+      </a:effectRef>
+      <a:fontRef idx="minor">
+        <a:schemeClr val="lt1"/>
+      </a:fontRef>
+    </dgm:style>
+  </dgm:styleLbl>
+  <dgm:styleLbl name="lnNode1">
+    <dgm:scene3d>
+      <a:camera prst="orthographicFront"/>
+      <a:lightRig rig="threePt" dir="t"/>
+    </dgm:scene3d>
+    <dgm:sp3d/>
+    <dgm:txPr/>
+    <dgm:style>
+      <a:lnRef idx="2">
+        <a:scrgbClr r="0" g="0" b="0"/>
+      </a:lnRef>
+      <a:fillRef idx="1">
+        <a:scrgbClr r="0" g="0" b="0"/>
+      </a:fillRef>
+      <a:effectRef idx="0">
+        <a:scrgbClr r="0" g="0" b="0"/>
+      </a:effectRef>
+      <a:fontRef idx="minor">
+        <a:schemeClr val="lt1"/>
+      </a:fontRef>
+    </dgm:style>
+  </dgm:styleLbl>
+  <dgm:styleLbl name="vennNode1">
+    <dgm:scene3d>
+      <a:camera prst="orthographicFront"/>
+      <a:lightRig rig="threePt" dir="t"/>
+    </dgm:scene3d>
+    <dgm:sp3d/>
+    <dgm:txPr/>
+    <dgm:style>
+      <a:lnRef idx="2">
+        <a:scrgbClr r="0" g="0" b="0"/>
+      </a:lnRef>
+      <a:fillRef idx="1">
+        <a:scrgbClr r="0" g="0" b="0"/>
+      </a:fillRef>
+      <a:effectRef idx="0">
+        <a:scrgbClr r="0" g="0" b="0"/>
+      </a:effectRef>
+      <a:fontRef idx="minor">
+        <a:schemeClr val="tx1"/>
+      </a:fontRef>
+    </dgm:style>
+  </dgm:styleLbl>
+  <dgm:styleLbl name="alignNode1">
+    <dgm:scene3d>
+      <a:camera prst="orthographicFront"/>
+      <a:lightRig rig="threePt" dir="t"/>
+    </dgm:scene3d>
+    <dgm:sp3d/>
+    <dgm:txPr/>
+    <dgm:style>
+      <a:lnRef idx="2">
+        <a:scrgbClr r="0" g="0" b="0"/>
+      </a:lnRef>
+      <a:fillRef idx="1">
+        <a:scrgbClr r="0" g="0" b="0"/>
+      </a:fillRef>
+      <a:effectRef idx="0">
+        <a:scrgbClr r="0" g="0" b="0"/>
+      </a:effectRef>
+      <a:fontRef idx="minor">
+        <a:schemeClr val="lt1"/>
+      </a:fontRef>
+    </dgm:style>
+  </dgm:styleLbl>
+  <dgm:styleLbl name="node1">
+    <dgm:scene3d>
+      <a:camera prst="orthographicFront"/>
+      <a:lightRig rig="threePt" dir="t"/>
+    </dgm:scene3d>
+    <dgm:sp3d/>
+    <dgm:txPr/>
+    <dgm:style>
+      <a:lnRef idx="2">
+        <a:scrgbClr r="0" g="0" b="0"/>
+      </a:lnRef>
+      <a:fillRef idx="1">
+        <a:scrgbClr r="0" g="0" b="0"/>
+      </a:fillRef>
+      <a:effectRef idx="0">
+        <a:scrgbClr r="0" g="0" b="0"/>
+      </a:effectRef>
+      <a:fontRef idx="minor">
+        <a:schemeClr val="lt1"/>
+      </a:fontRef>
+    </dgm:style>
+  </dgm:styleLbl>
+  <dgm:styleLbl name="node2">
+    <dgm:scene3d>
+      <a:camera prst="orthographicFront"/>
+      <a:lightRig rig="threePt" dir="t"/>
+    </dgm:scene3d>
+    <dgm:sp3d/>
+    <dgm:txPr/>
+    <dgm:style>
+      <a:lnRef idx="2">
+        <a:scrgbClr r="0" g="0" b="0"/>
+      </a:lnRef>
+      <a:fillRef idx="1">
+        <a:scrgbClr r="0" g="0" b="0"/>
+      </a:fillRef>
+      <a:effectRef idx="0">
+        <a:scrgbClr r="0" g="0" b="0"/>
+      </a:effectRef>
+      <a:fontRef idx="minor">
+        <a:schemeClr val="lt1"/>
+      </a:fontRef>
+    </dgm:style>
+  </dgm:styleLbl>
+  <dgm:styleLbl name="node3">
+    <dgm:scene3d>
+      <a:camera prst="orthographicFront"/>
+      <a:lightRig rig="threePt" dir="t"/>
+    </dgm:scene3d>
+    <dgm:sp3d/>
+    <dgm:txPr/>
+    <dgm:style>
+      <a:lnRef idx="2">
+        <a:scrgbClr r="0" g="0" b="0"/>
+      </a:lnRef>
+      <a:fillRef idx="1">
+        <a:scrgbClr r="0" g="0" b="0"/>
+      </a:fillRef>
+      <a:effectRef idx="0">
+        <a:scrgbClr r="0" g="0" b="0"/>
+      </a:effectRef>
+      <a:fontRef idx="minor">
+        <a:schemeClr val="lt1"/>
+      </a:fontRef>
+    </dgm:style>
+  </dgm:styleLbl>
+  <dgm:styleLbl name="node4">
+    <dgm:scene3d>
+      <a:camera prst="orthographicFront"/>
+      <a:lightRig rig="threePt" dir="t"/>
+    </dgm:scene3d>
+    <dgm:sp3d/>
+    <dgm:txPr/>
+    <dgm:style>
+      <a:lnRef idx="2">
+        <a:scrgbClr r="0" g="0" b="0"/>
+      </a:lnRef>
+      <a:fillRef idx="1">
+        <a:scrgbClr r="0" g="0" b="0"/>
+      </a:fillRef>
+      <a:effectRef idx="0">
+        <a:scrgbClr r="0" g="0" b="0"/>
+      </a:effectRef>
+      <a:fontRef idx="minor">
+        <a:schemeClr val="lt1"/>
+      </a:fontRef>
+    </dgm:style>
+  </dgm:styleLbl>
+  <dgm:styleLbl name="fgImgPlace1">
+    <dgm:scene3d>
+      <a:camera prst="orthographicFront"/>
+      <a:lightRig rig="threePt" dir="t"/>
+    </dgm:scene3d>
+    <dgm:sp3d/>
+    <dgm:txPr/>
+    <dgm:style>
+      <a:lnRef idx="2">
+        <a:scrgbClr r="0" g="0" b="0"/>
+      </a:lnRef>
+      <a:fillRef idx="1">
+        <a:scrgbClr r="0" g="0" b="0"/>
+      </a:fillRef>
+      <a:effectRef idx="0">
+        <a:scrgbClr r="0" g="0" b="0"/>
+      </a:effectRef>
+      <a:fontRef idx="minor"/>
+    </dgm:style>
+  </dgm:styleLbl>
+  <dgm:styleLbl name="alignImgPlace1">
+    <dgm:scene3d>
+      <a:camera prst="orthographicFront"/>
+      <a:lightRig rig="threePt" dir="t"/>
+    </dgm:scene3d>
+    <dgm:sp3d/>
+    <dgm:txPr/>
+    <dgm:style>
+      <a:lnRef idx="2">
+        <a:scrgbClr r="0" g="0" b="0"/>
+      </a:lnRef>
+      <a:fillRef idx="1">
+        <a:scrgbClr r="0" g="0" b="0"/>
+      </a:fillRef>
+      <a:effectRef idx="0">
+        <a:scrgbClr r="0" g="0" b="0"/>
+      </a:effectRef>
+      <a:fontRef idx="minor"/>
+    </dgm:style>
+  </dgm:styleLbl>
+  <dgm:styleLbl name="bgImgPlace1">
+    <dgm:scene3d>
+      <a:camera prst="orthographicFront"/>
+      <a:lightRig rig="threePt" dir="t"/>
+    </dgm:scene3d>
+    <dgm:sp3d/>
+    <dgm:txPr/>
+    <dgm:style>
+      <a:lnRef idx="2">
+        <a:scrgbClr r="0" g="0" b="0"/>
+      </a:lnRef>
+      <a:fillRef idx="1">
+        <a:scrgbClr r="0" g="0" b="0"/>
+      </a:fillRef>
+      <a:effectRef idx="0">
+        <a:scrgbClr r="0" g="0" b="0"/>
+      </a:effectRef>
+      <a:fontRef idx="minor"/>
+    </dgm:style>
+  </dgm:styleLbl>
+  <dgm:styleLbl name="sibTrans2D1">
+    <dgm:scene3d>
+      <a:camera prst="orthographicFront"/>
+      <a:lightRig rig="threePt" dir="t"/>
+    </dgm:scene3d>
+    <dgm:sp3d/>
+    <dgm:txPr/>
+    <dgm:style>
+      <a:lnRef idx="0">
+        <a:scrgbClr r="0" g="0" b="0"/>
+      </a:lnRef>
+      <a:fillRef idx="1">
+        <a:scrgbClr r="0" g="0" b="0"/>
+      </a:fillRef>
+      <a:effectRef idx="0">
+        <a:scrgbClr r="0" g="0" b="0"/>
+      </a:effectRef>
+      <a:fontRef idx="minor">
+        <a:schemeClr val="lt1"/>
+      </a:fontRef>
+    </dgm:style>
+  </dgm:styleLbl>
+  <dgm:styleLbl name="fgSibTrans2D1">
+    <dgm:scene3d>
+      <a:camera prst="orthographicFront"/>
+      <a:lightRig rig="threePt" dir="t"/>
+    </dgm:scene3d>
+    <dgm:sp3d/>
+    <dgm:txPr/>
+    <dgm:style>
+      <a:lnRef idx="0">
+        <a:scrgbClr r="0" g="0" b="0"/>
+      </a:lnRef>
+      <a:fillRef idx="1">
+        <a:scrgbClr r="0" g="0" b="0"/>
+      </a:fillRef>
+      <a:effectRef idx="0">
+        <a:scrgbClr r="0" g="0" b="0"/>
+      </a:effectRef>
+      <a:fontRef idx="minor">
+        <a:schemeClr val="lt1"/>
+      </a:fontRef>
+    </dgm:style>
+  </dgm:styleLbl>
+  <dgm:styleLbl name="bgSibTrans2D1">
+    <dgm:scene3d>
+      <a:camera prst="orthographicFront"/>
+      <a:lightRig rig="threePt" dir="t"/>
+    </dgm:scene3d>
+    <dgm:sp3d/>
+    <dgm:txPr/>
+    <dgm:style>
+      <a:lnRef idx="0">
+        <a:scrgbClr r="0" g="0" b="0"/>
+      </a:lnRef>
+      <a:fillRef idx="1">
+        <a:scrgbClr r="0" g="0" b="0"/>
+      </a:fillRef>
+      <a:effectRef idx="0">
+        <a:scrgbClr r="0" g="0" b="0"/>
+      </a:effectRef>
+      <a:fontRef idx="minor">
+        <a:schemeClr val="lt1"/>
+      </a:fontRef>
+    </dgm:style>
+  </dgm:styleLbl>
+  <dgm:styleLbl name="sibTrans1D1">
+    <dgm:scene3d>
+      <a:camera prst="orthographicFront"/>
+      <a:lightRig rig="threePt" dir="t"/>
+    </dgm:scene3d>
+    <dgm:sp3d/>
+    <dgm:txPr/>
+    <dgm:style>
+      <a:lnRef idx="1">
+        <a:scrgbClr r="0" g="0" b="0"/>
+      </a:lnRef>
+      <a:fillRef idx="0">
+        <a:scrgbClr r="0" g="0" b="0"/>
+      </a:fillRef>
+      <a:effectRef idx="0">
+        <a:scrgbClr r="0" g="0" b="0"/>
+      </a:effectRef>
+      <a:fontRef idx="minor"/>
+    </dgm:style>
+  </dgm:styleLbl>
+  <dgm:styleLbl name="callout">
+    <dgm:scene3d>
+      <a:camera prst="orthographicFront"/>
+      <a:lightRig rig="threePt" dir="t"/>
+    </dgm:scene3d>
+    <dgm:sp3d/>
+    <dgm:txPr/>
+    <dgm:style>
+      <a:lnRef idx="2">
+        <a:scrgbClr r="0" g="0" b="0"/>
+      </a:lnRef>
+      <a:fillRef idx="1">
+        <a:scrgbClr r="0" g="0" b="0"/>
+      </a:fillRef>
+      <a:effectRef idx="0">
+        <a:scrgbClr r="0" g="0" b="0"/>
+      </a:effectRef>
+      <a:fontRef idx="minor"/>
+    </dgm:style>
+  </dgm:styleLbl>
+  <dgm:styleLbl name="asst0">
+    <dgm:scene3d>
+      <a:camera prst="orthographicFront"/>
+      <a:lightRig rig="threePt" dir="t"/>
+    </dgm:scene3d>
+    <dgm:sp3d/>
+    <dgm:txPr/>
+    <dgm:style>
+      <a:lnRef idx="2">
+        <a:scrgbClr r="0" g="0" b="0"/>
+      </a:lnRef>
+      <a:fillRef idx="1">
+        <a:scrgbClr r="0" g="0" b="0"/>
+      </a:fillRef>
+      <a:effectRef idx="0">
+        <a:scrgbClr r="0" g="0" b="0"/>
+      </a:effectRef>
+      <a:fontRef idx="minor">
+        <a:schemeClr val="lt1"/>
+      </a:fontRef>
+    </dgm:style>
+  </dgm:styleLbl>
+  <dgm:styleLbl name="asst1">
+    <dgm:scene3d>
+      <a:camera prst="orthographicFront"/>
+      <a:lightRig rig="threePt" dir="t"/>
+    </dgm:scene3d>
+    <dgm:sp3d/>
+    <dgm:txPr/>
+    <dgm:style>
+      <a:lnRef idx="2">
+        <a:scrgbClr r="0" g="0" b="0"/>
+      </a:lnRef>
+      <a:fillRef idx="1">
+        <a:scrgbClr r="0" g="0" b="0"/>
+      </a:fillRef>
+      <a:effectRef idx="0">
+        <a:scrgbClr r="0" g="0" b="0"/>
+      </a:effectRef>
+      <a:fontRef idx="minor">
+        <a:schemeClr val="lt1"/>
+      </a:fontRef>
+    </dgm:style>
+  </dgm:styleLbl>
+  <dgm:styleLbl name="asst2">
+    <dgm:scene3d>
+      <a:camera prst="orthographicFront"/>
+      <a:lightRig rig="threePt" dir="t"/>
+    </dgm:scene3d>
+    <dgm:sp3d/>
+    <dgm:txPr/>
+    <dgm:style>
+      <a:lnRef idx="2">
+        <a:scrgbClr r="0" g="0" b="0"/>
+      </a:lnRef>
+      <a:fillRef idx="1">
+        <a:scrgbClr r="0" g="0" b="0"/>
+      </a:fillRef>
+      <a:effectRef idx="0">
+        <a:scrgbClr r="0" g="0" b="0"/>
+      </a:effectRef>
+      <a:fontRef idx="minor">
+        <a:schemeClr val="lt1"/>
+      </a:fontRef>
+    </dgm:style>
+  </dgm:styleLbl>
+  <dgm:styleLbl name="asst3">
+    <dgm:scene3d>
+      <a:camera prst="orthographicFront"/>
+      <a:lightRig rig="threePt" dir="t"/>
+    </dgm:scene3d>
+    <dgm:sp3d/>
+    <dgm:txPr/>
+    <dgm:style>
+      <a:lnRef idx="2">
+        <a:scrgbClr r="0" g="0" b="0"/>
+      </a:lnRef>
+      <a:fillRef idx="1">
+        <a:scrgbClr r="0" g="0" b="0"/>
+      </a:fillRef>
+      <a:effectRef idx="0">
+        <a:scrgbClr r="0" g="0" b="0"/>
+      </a:effectRef>
+      <a:fontRef idx="minor">
+        <a:schemeClr val="lt1"/>
+      </a:fontRef>
+    </dgm:style>
+  </dgm:styleLbl>
+  <dgm:styleLbl name="asst4">
+    <dgm:scene3d>
+      <a:camera prst="orthographicFront"/>
+      <a:lightRig rig="threePt" dir="t"/>
+    </dgm:scene3d>
+    <dgm:sp3d/>
+    <dgm:txPr/>
+    <dgm:style>
+      <a:lnRef idx="2">
+        <a:scrgbClr r="0" g="0" b="0"/>
+      </a:lnRef>
+      <a:fillRef idx="1">
+        <a:scrgbClr r="0" g="0" b="0"/>
+      </a:fillRef>
+      <a:effectRef idx="0">
+        <a:scrgbClr r="0" g="0" b="0"/>
+      </a:effectRef>
+      <a:fontRef idx="minor">
+        <a:schemeClr val="lt1"/>
+      </a:fontRef>
+    </dgm:style>
+  </dgm:styleLbl>
+  <dgm:styleLbl name="parChTrans2D1">
+    <dgm:scene3d>
+      <a:camera prst="orthographicFront"/>
+      <a:lightRig rig="threePt" dir="t"/>
+    </dgm:scene3d>
+    <dgm:sp3d/>
+    <dgm:txPr/>
+    <dgm:style>
+      <a:lnRef idx="2">
+        <a:scrgbClr r="0" g="0" b="0"/>
+      </a:lnRef>
+      <a:fillRef idx="1">
+        <a:scrgbClr r="0" g="0" b="0"/>
+      </a:fillRef>
+      <a:effectRef idx="0">
+        <a:scrgbClr r="0" g="0" b="0"/>
+      </a:effectRef>
+      <a:fontRef idx="minor">
+        <a:schemeClr val="lt1"/>
+      </a:fontRef>
+    </dgm:style>
+  </dgm:styleLbl>
+  <dgm:styleLbl name="parChTrans2D2">
+    <dgm:scene3d>
+      <a:camera prst="orthographicFront"/>
+      <a:lightRig rig="threePt" dir="t"/>
+    </dgm:scene3d>
+    <dgm:sp3d/>
+    <dgm:txPr/>
+    <dgm:style>
+      <a:lnRef idx="2">
+        <a:scrgbClr r="0" g="0" b="0"/>
+      </a:lnRef>
+      <a:fillRef idx="1">
+        <a:scrgbClr r="0" g="0" b="0"/>
+      </a:fillRef>
+      <a:effectRef idx="0">
+        <a:scrgbClr r="0" g="0" b="0"/>
+      </a:effectRef>
+      <a:fontRef idx="minor">
+        <a:schemeClr val="lt1"/>
+      </a:fontRef>
+    </dgm:style>
+  </dgm:styleLbl>
+  <dgm:styleLbl name="parChTrans2D3">
+    <dgm:scene3d>
+      <a:camera prst="orthographicFront"/>
+      <a:lightRig rig="threePt" dir="t"/>
+    </dgm:scene3d>
+    <dgm:sp3d/>
+    <dgm:txPr/>
+    <dgm:style>
+      <a:lnRef idx="2">
+        <a:scrgbClr r="0" g="0" b="0"/>
+      </a:lnRef>
+      <a:fillRef idx="1">
+        <a:scrgbClr r="0" g="0" b="0"/>
+      </a:fillRef>
+      <a:effectRef idx="0">
+        <a:scrgbClr r="0" g="0" b="0"/>
+      </a:effectRef>
+      <a:fontRef idx="minor">
+        <a:schemeClr val="lt1"/>
+      </a:fontRef>
+    </dgm:style>
+  </dgm:styleLbl>
+  <dgm:styleLbl name="parChTrans2D4">
+    <dgm:scene3d>
+      <a:camera prst="orthographicFront"/>
+      <a:lightRig rig="threePt" dir="t"/>
+    </dgm:scene3d>
+    <dgm:sp3d/>
+    <dgm:txPr/>
+    <dgm:style>
+      <a:lnRef idx="2">
+        <a:scrgbClr r="0" g="0" b="0"/>
+      </a:lnRef>
+      <a:fillRef idx="1">
+        <a:scrgbClr r="0" g="0" b="0"/>
+      </a:fillRef>
+      <a:effectRef idx="0">
+        <a:scrgbClr r="0" g="0" b="0"/>
+      </a:effectRef>
+      <a:fontRef idx="minor">
+        <a:schemeClr val="lt1"/>
+      </a:fontRef>
+    </dgm:style>
+  </dgm:styleLbl>
+  <dgm:styleLbl name="parChTrans1D1">
+    <dgm:scene3d>
+      <a:camera prst="orthographicFront"/>
+      <a:lightRig rig="threePt" dir="t"/>
+    </dgm:scene3d>
+    <dgm:sp3d/>
+    <dgm:txPr/>
+    <dgm:style>
+      <a:lnRef idx="2">
+        <a:scrgbClr r="0" g="0" b="0"/>
+      </a:lnRef>
+      <a:fillRef idx="0">
+        <a:scrgbClr r="0" g="0" b="0"/>
+      </a:fillRef>
+      <a:effectRef idx="0">
+        <a:scrgbClr r="0" g="0" b="0"/>
+      </a:effectRef>
+      <a:fontRef idx="minor"/>
+    </dgm:style>
+  </dgm:styleLbl>
+  <dgm:styleLbl name="parChTrans1D2">
+    <dgm:scene3d>
+      <a:camera prst="orthographicFront"/>
+      <a:lightRig rig="threePt" dir="t"/>
+    </dgm:scene3d>
+    <dgm:sp3d/>
+    <dgm:txPr/>
+    <dgm:style>
+      <a:lnRef idx="2">
+        <a:scrgbClr r="0" g="0" b="0"/>
+      </a:lnRef>
+      <a:fillRef idx="0">
+        <a:scrgbClr r="0" g="0" b="0"/>
+      </a:fillRef>
+      <a:effectRef idx="0">
+        <a:scrgbClr r="0" g="0" b="0"/>
+      </a:effectRef>
+      <a:fontRef idx="minor"/>
+    </dgm:style>
+  </dgm:styleLbl>
+  <dgm:styleLbl name="parChTrans1D3">
+    <dgm:scene3d>
+      <a:camera prst="orthographicFront"/>
+      <a:lightRig rig="threePt" dir="t"/>
+    </dgm:scene3d>
+    <dgm:sp3d/>
+    <dgm:txPr/>
+    <dgm:style>
+      <a:lnRef idx="2">
+        <a:scrgbClr r="0" g="0" b="0"/>
+      </a:lnRef>
+      <a:fillRef idx="0">
+        <a:scrgbClr r="0" g="0" b="0"/>
+      </a:fillRef>
+      <a:effectRef idx="0">
+        <a:scrgbClr r="0" g="0" b="0"/>
+      </a:effectRef>
+      <a:fontRef idx="minor"/>
+    </dgm:style>
+  </dgm:styleLbl>
+  <dgm:styleLbl name="parChTrans1D4">
+    <dgm:scene3d>
+      <a:camera prst="orthographicFront"/>
+      <a:lightRig rig="threePt" dir="t"/>
+    </dgm:scene3d>
+    <dgm:sp3d/>
+    <dgm:txPr/>
+    <dgm:style>
+      <a:lnRef idx="2">
+        <a:scrgbClr r="0" g="0" b="0"/>
+      </a:lnRef>
+      <a:fillRef idx="0">
+        <a:scrgbClr r="0" g="0" b="0"/>
+      </a:fillRef>
+      <a:effectRef idx="0">
+        <a:scrgbClr r="0" g="0" b="0"/>
+      </a:effectRef>
+      <a:fontRef idx="minor"/>
+    </dgm:style>
+  </dgm:styleLbl>
+  <dgm:styleLbl name="fgAcc1">
+    <dgm:scene3d>
+      <a:camera prst="orthographicFront"/>
+      <a:lightRig rig="threePt" dir="t"/>
+    </dgm:scene3d>
+    <dgm:sp3d/>
+    <dgm:txPr/>
+    <dgm:style>
+      <a:lnRef idx="2">
+        <a:scrgbClr r="0" g="0" b="0"/>
+      </a:lnRef>
+      <a:fillRef idx="1">
+        <a:scrgbClr r="0" g="0" b="0"/>
+      </a:fillRef>
+      <a:effectRef idx="0">
+        <a:scrgbClr r="0" g="0" b="0"/>
+      </a:effectRef>
+      <a:fontRef idx="minor"/>
+    </dgm:style>
+  </dgm:styleLbl>
+  <dgm:styleLbl name="conFgAcc1">
+    <dgm:scene3d>
+      <a:camera prst="orthographicFront"/>
+      <a:lightRig rig="threePt" dir="t"/>
+    </dgm:scene3d>
+    <dgm:sp3d/>
+    <dgm:txPr/>
+    <dgm:style>
+      <a:lnRef idx="2">
+        <a:scrgbClr r="0" g="0" b="0"/>
+      </a:lnRef>
+      <a:fillRef idx="1">
+        <a:scrgbClr r="0" g="0" b="0"/>
+      </a:fillRef>
+      <a:effectRef idx="0">
+        <a:scrgbClr r="0" g="0" b="0"/>
+      </a:effectRef>
+      <a:fontRef idx="minor"/>
+    </dgm:style>
+  </dgm:styleLbl>
+  <dgm:styleLbl name="alignAcc1">
+    <dgm:scene3d>
+      <a:camera prst="orthographicFront"/>
+      <a:lightRig rig="threePt" dir="t"/>
+    </dgm:scene3d>
+    <dgm:sp3d/>
+    <dgm:txPr/>
+    <dgm:style>
+      <a:lnRef idx="2">
+        <a:scrgbClr r="0" g="0" b="0"/>
+      </a:lnRef>
+      <a:fillRef idx="1">
+        <a:scrgbClr r="0" g="0" b="0"/>
+      </a:fillRef>
+      <a:effectRef idx="0">
+        <a:scrgbClr r="0" g="0" b="0"/>
+      </a:effectRef>
+      <a:fontRef idx="minor"/>
+    </dgm:style>
+  </dgm:styleLbl>
+  <dgm:styleLbl name="trAlignAcc1">
+    <dgm:scene3d>
+      <a:camera prst="orthographicFront"/>
+      <a:lightRig rig="threePt" dir="t"/>
+    </dgm:scene3d>
+    <dgm:sp3d/>
+    <dgm:txPr/>
+    <dgm:style>
+      <a:lnRef idx="1">
+        <a:scrgbClr r="0" g="0" b="0"/>
+      </a:lnRef>
+      <a:fillRef idx="1">
+        <a:scrgbClr r="0" g="0" b="0"/>
+      </a:fillRef>
+      <a:effectRef idx="0">
+        <a:scrgbClr r="0" g="0" b="0"/>
+      </a:effectRef>
+      <a:fontRef idx="minor"/>
+    </dgm:style>
+  </dgm:styleLbl>
+  <dgm:styleLbl name="bgAcc1">
+    <dgm:scene3d>
+      <a:camera prst="orthographicFront"/>
+      <a:lightRig rig="threePt" dir="t"/>
+    </dgm:scene3d>
+    <dgm:sp3d/>
+    <dgm:txPr/>
+    <dgm:style>
+      <a:lnRef idx="2">
+        <a:scrgbClr r="0" g="0" b="0"/>
+      </a:lnRef>
+      <a:fillRef idx="1">
+        <a:scrgbClr r="0" g="0" b="0"/>
+      </a:fillRef>
+      <a:effectRef idx="0">
+        <a:scrgbClr r="0" g="0" b="0"/>
+      </a:effectRef>
+      <a:fontRef idx="minor"/>
+    </dgm:style>
+  </dgm:styleLbl>
+  <dgm:styleLbl name="solidFgAcc1">
+    <dgm:scene3d>
+      <a:camera prst="orthographicFront"/>
+      <a:lightRig rig="threePt" dir="t"/>
+    </dgm:scene3d>
+    <dgm:sp3d/>
+    <dgm:txPr/>
+    <dgm:style>
+      <a:lnRef idx="2">
+        <a:scrgbClr r="0" g="0" b="0"/>
+      </a:lnRef>
+      <a:fillRef idx="1">
+        <a:scrgbClr r="0" g="0" b="0"/>
+      </a:fillRef>
+      <a:effectRef idx="0">
+        <a:scrgbClr r="0" g="0" b="0"/>
+      </a:effectRef>
+      <a:fontRef idx="minor"/>
+    </dgm:style>
+  </dgm:styleLbl>
+  <dgm:styleLbl name="solidAlignAcc1">
+    <dgm:scene3d>
+      <a:camera prst="orthographicFront"/>
+      <a:lightRig rig="threePt" dir="t"/>
+    </dgm:scene3d>
+    <dgm:sp3d/>
+    <dgm:txPr/>
+    <dgm:style>
+      <a:lnRef idx="2">
+        <a:scrgbClr r="0" g="0" b="0"/>
+      </a:lnRef>
+      <a:fillRef idx="1">
+        <a:scrgbClr r="0" g="0" b="0"/>
+      </a:fillRef>
+      <a:effectRef idx="0">
+        <a:scrgbClr r="0" g="0" b="0"/>
+      </a:effectRef>
+      <a:fontRef idx="minor"/>
+    </dgm:style>
+  </dgm:styleLbl>
+  <dgm:styleLbl name="solidBgAcc1">
+    <dgm:scene3d>
+      <a:camera prst="orthographicFront"/>
+      <a:lightRig rig="threePt" dir="t"/>
+    </dgm:scene3d>
+    <dgm:sp3d/>
+    <dgm:txPr/>
+    <dgm:style>
+      <a:lnRef idx="2">
+        <a:scrgbClr r="0" g="0" b="0"/>
+      </a:lnRef>
+      <a:fillRef idx="1">
+        <a:scrgbClr r="0" g="0" b="0"/>
+      </a:fillRef>
+      <a:effectRef idx="0">
+        <a:scrgbClr r="0" g="0" b="0"/>
+      </a:effectRef>
+      <a:fontRef idx="minor"/>
+    </dgm:style>
+  </dgm:styleLbl>
+  <dgm:styleLbl name="fgAccFollowNode1">
+    <dgm:scene3d>
+      <a:camera prst="orthographicFront"/>
+      <a:lightRig rig="threePt" dir="t"/>
+    </dgm:scene3d>
+    <dgm:sp3d/>
+    <dgm:txPr/>
+    <dgm:style>
+      <a:lnRef idx="2">
+        <a:scrgbClr r="0" g="0" b="0"/>
+      </a:lnRef>
+      <a:fillRef idx="1">
+        <a:scrgbClr r="0" g="0" b="0"/>
+      </a:fillRef>
+      <a:effectRef idx="0">
+        <a:scrgbClr r="0" g="0" b="0"/>
+      </a:effectRef>
+      <a:fontRef idx="minor"/>
+    </dgm:style>
+  </dgm:styleLbl>
+  <dgm:styleLbl name="alignAccFollowNode1">
+    <dgm:scene3d>
+      <a:camera prst="orthographicFront"/>
+      <a:lightRig rig="threePt" dir="t"/>
+    </dgm:scene3d>
+    <dgm:sp3d/>
+    <dgm:txPr/>
+    <dgm:style>
+      <a:lnRef idx="2">
+        <a:scrgbClr r="0" g="0" b="0"/>
+      </a:lnRef>
+      <a:fillRef idx="1">
+        <a:scrgbClr r="0" g="0" b="0"/>
+      </a:fillRef>
+      <a:effectRef idx="0">
+        <a:scrgbClr r="0" g="0" b="0"/>
+      </a:effectRef>
+      <a:fontRef idx="minor"/>
+    </dgm:style>
+  </dgm:styleLbl>
+  <dgm:styleLbl name="bgAccFollowNode1">
+    <dgm:scene3d>
+      <a:camera prst="orthographicFront"/>
+      <a:lightRig rig="threePt" dir="t"/>
+    </dgm:scene3d>
+    <dgm:sp3d/>
+    <dgm:txPr/>
+    <dgm:style>
+      <a:lnRef idx="2">
+        <a:scrgbClr r="0" g="0" b="0"/>
+      </a:lnRef>
+      <a:fillRef idx="1">
+        <a:scrgbClr r="0" g="0" b="0"/>
+      </a:fillRef>
+      <a:effectRef idx="0">
+        <a:scrgbClr r="0" g="0" b="0"/>
+      </a:effectRef>
+      <a:fontRef idx="minor"/>
+    </dgm:style>
+  </dgm:styleLbl>
+  <dgm:styleLbl name="fgAcc0">
+    <dgm:scene3d>
+      <a:camera prst="orthographicFront"/>
+      <a:lightRig rig="threePt" dir="t"/>
+    </dgm:scene3d>
+    <dgm:sp3d/>
+    <dgm:txPr/>
+    <dgm:style>
+      <a:lnRef idx="2">
+        <a:scrgbClr r="0" g="0" b="0"/>
+      </a:lnRef>
+      <a:fillRef idx="1">
+        <a:scrgbClr r="0" g="0" b="0"/>
+      </a:fillRef>
+      <a:effectRef idx="0">
+        <a:scrgbClr r="0" g="0" b="0"/>
+      </a:effectRef>
+      <a:fontRef idx="minor"/>
+    </dgm:style>
+  </dgm:styleLbl>
+  <dgm:styleLbl name="fgAcc2">
+    <dgm:scene3d>
+      <a:camera prst="orthographicFront"/>
+      <a:lightRig rig="threePt" dir="t"/>
+    </dgm:scene3d>
+    <dgm:sp3d/>
+    <dgm:txPr/>
+    <dgm:style>
+      <a:lnRef idx="2">
+        <a:scrgbClr r="0" g="0" b="0"/>
+      </a:lnRef>
+      <a:fillRef idx="1">
+        <a:scrgbClr r="0" g="0" b="0"/>
+      </a:fillRef>
+      <a:effectRef idx="0">
+        <a:scrgbClr r="0" g="0" b="0"/>
+      </a:effectRef>
+      <a:fontRef idx="minor"/>
+    </dgm:style>
+  </dgm:styleLbl>
+  <dgm:styleLbl name="fgAcc3">
+    <dgm:scene3d>
+      <a:camera prst="orthographicFront"/>
+      <a:lightRig rig="threePt" dir="t"/>
+    </dgm:scene3d>
+    <dgm:sp3d/>
+    <dgm:txPr/>
+    <dgm:style>
+      <a:lnRef idx="2">
+        <a:scrgbClr r="0" g="0" b="0"/>
+      </a:lnRef>
+      <a:fillRef idx="1">
+        <a:scrgbClr r="0" g="0" b="0"/>
+      </a:fillRef>
+      <a:effectRef idx="0">
+        <a:scrgbClr r="0" g="0" b="0"/>
+      </a:effectRef>
+      <a:fontRef idx="minor"/>
+    </dgm:style>
+  </dgm:styleLbl>
+  <dgm:styleLbl name="fgAcc4">
+    <dgm:scene3d>
+      <a:camera prst="orthographicFront"/>
+      <a:lightRig rig="threePt" dir="t"/>
+    </dgm:scene3d>
+    <dgm:sp3d/>
+    <dgm:txPr/>
+    <dgm:style>
+      <a:lnRef idx="2">
+        <a:scrgbClr r="0" g="0" b="0"/>
+      </a:lnRef>
+      <a:fillRef idx="1">
+        <a:scrgbClr r="0" g="0" b="0"/>
+      </a:fillRef>
+      <a:effectRef idx="0">
+        <a:scrgbClr r="0" g="0" b="0"/>
+      </a:effectRef>
+      <a:fontRef idx="minor"/>
+    </dgm:style>
+  </dgm:styleLbl>
+  <dgm:styleLbl name="bgShp">
+    <dgm:scene3d>
+      <a:camera prst="orthographicFront"/>
+      <a:lightRig rig="threePt" dir="t"/>
+    </dgm:scene3d>
+    <dgm:sp3d/>
+    <dgm:txPr/>
+    <dgm:style>
+      <a:lnRef idx="0">
+        <a:scrgbClr r="0" g="0" b="0"/>
+      </a:lnRef>
+      <a:fillRef idx="1">
+        <a:scrgbClr r="0" g="0" b="0"/>
+      </a:fillRef>
+      <a:effectRef idx="0">
+        <a:scrgbClr r="0" g="0" b="0"/>
+      </a:effectRef>
+      <a:fontRef idx="minor"/>
+    </dgm:style>
+  </dgm:styleLbl>
+  <dgm:styleLbl name="dkBgShp">
+    <dgm:scene3d>
+      <a:camera prst="orthographicFront"/>
+      <a:lightRig rig="threePt" dir="t"/>
+    </dgm:scene3d>
+    <dgm:sp3d/>
+    <dgm:txPr/>
+    <dgm:style>
+      <a:lnRef idx="0">
+        <a:scrgbClr r="0" g="0" b="0"/>
+      </a:lnRef>
+      <a:fillRef idx="1">
+        <a:scrgbClr r="0" g="0" b="0"/>
+      </a:fillRef>
+      <a:effectRef idx="0">
+        <a:scrgbClr r="0" g="0" b="0"/>
+      </a:effectRef>
+      <a:fontRef idx="minor"/>
+    </dgm:style>
+  </dgm:styleLbl>
+  <dgm:styleLbl name="trBgShp">
+    <dgm:scene3d>
+      <a:camera prst="orthographicFront"/>
+      <a:lightRig rig="threePt" dir="t"/>
+    </dgm:scene3d>
+    <dgm:sp3d/>
+    <dgm:txPr/>
+    <dgm:style>
+      <a:lnRef idx="0">
+        <a:scrgbClr r="0" g="0" b="0"/>
+      </a:lnRef>
+      <a:fillRef idx="1">
+        <a:scrgbClr r="0" g="0" b="0"/>
+      </a:fillRef>
+      <a:effectRef idx="0">
+        <a:scrgbClr r="0" g="0" b="0"/>
+      </a:effectRef>
+      <a:fontRef idx="minor"/>
+    </dgm:style>
+  </dgm:styleLbl>
+  <dgm:styleLbl name="fgShp">
+    <dgm:scene3d>
+      <a:camera prst="orthographicFront"/>
+      <a:lightRig rig="threePt" dir="t"/>
+    </dgm:scene3d>
+    <dgm:sp3d/>
+    <dgm:txPr/>
+    <dgm:style>
+      <a:lnRef idx="2">
+        <a:scrgbClr r="0" g="0" b="0"/>
+      </a:lnRef>
+      <a:fillRef idx="1">
+        <a:scrgbClr r="0" g="0" b="0"/>
+      </a:fillRef>
+      <a:effectRef idx="0">
+        <a:scrgbClr r="0" g="0" b="0"/>
+      </a:effectRef>
+      <a:fontRef idx="minor"/>
+    </dgm:style>
+  </dgm:styleLbl>
+  <dgm:styleLbl name="revTx">
+    <dgm:scene3d>
+      <a:camera prst="orthographicFront"/>
+      <a:lightRig rig="threePt" dir="t"/>
+    </dgm:scene3d>
+    <dgm:sp3d/>
+    <dgm:txPr/>
+    <dgm:style>
+      <a:lnRef idx="0">
+        <a:scrgbClr r="0" g="0" b="0"/>
+      </a:lnRef>
+      <a:fillRef idx="0">
+        <a:scrgbClr r="0" g="0" b="0"/>
+      </a:fillRef>
+      <a:effectRef idx="0">
+        <a:scrgbClr r="0" g="0" b="0"/>
+      </a:effectRef>
+      <a:fontRef idx="minor"/>
+    </dgm:style>
+  </dgm:styleLbl>
+</dgm:styleDef>
 </file>
 
 <file path=ppt/notesMasters/notesMaster1.xml><?xml version="1.0" encoding="utf-8"?>
@@ -196,7 +2712,7 @@
           <a:p>
             <a:fld id="{32A3BFE3-4062-4AF1-ABFC-DCD65D5FEDDC}" type="datetimeFigureOut">
               <a:rPr lang="fr-FR" smtClean="0"/>
-              <a:t>23/12/2025</a:t>
+              <a:t>24/12/2025</a:t>
             </a:fld>
             <a:endParaRPr lang="fr-FR"/>
           </a:p>
@@ -610,7 +3126,7 @@
           <a:p>
             <a:fld id="{E17A879C-0A64-469E-B8A2-BF5BD165327D}" type="datetime1">
               <a:rPr lang="fr-FR" smtClean="0"/>
-              <a:t>23/12/2025</a:t>
+              <a:t>24/12/2025</a:t>
             </a:fld>
             <a:endParaRPr lang="fr-FR"/>
           </a:p>
@@ -808,7 +3324,7 @@
           <a:p>
             <a:fld id="{8E5A5641-7E66-483F-B0F2-069C9F76BD77}" type="datetime1">
               <a:rPr lang="fr-FR" smtClean="0"/>
-              <a:t>23/12/2025</a:t>
+              <a:t>24/12/2025</a:t>
             </a:fld>
             <a:endParaRPr lang="fr-FR"/>
           </a:p>
@@ -1016,7 +3532,7 @@
           <a:p>
             <a:fld id="{17124552-7DE6-47BF-985F-BA179E876D16}" type="datetime1">
               <a:rPr lang="fr-FR" smtClean="0"/>
-              <a:t>23/12/2025</a:t>
+              <a:t>24/12/2025</a:t>
             </a:fld>
             <a:endParaRPr lang="fr-FR"/>
           </a:p>
@@ -1214,7 +3730,7 @@
           <a:p>
             <a:fld id="{1A68892B-77F5-4CCA-9591-F24D93FDE34B}" type="datetime1">
               <a:rPr lang="fr-FR" smtClean="0"/>
-              <a:t>23/12/2025</a:t>
+              <a:t>24/12/2025</a:t>
             </a:fld>
             <a:endParaRPr lang="fr-FR"/>
           </a:p>
@@ -1489,7 +4005,7 @@
           <a:p>
             <a:fld id="{26018E9A-1945-4557-AEB5-4F18FF624DDF}" type="datetime1">
               <a:rPr lang="fr-FR" smtClean="0"/>
-              <a:t>23/12/2025</a:t>
+              <a:t>24/12/2025</a:t>
             </a:fld>
             <a:endParaRPr lang="fr-FR"/>
           </a:p>
@@ -1754,7 +4270,7 @@
           <a:p>
             <a:fld id="{A2165A06-8B1B-4E56-A989-A836DCD313FB}" type="datetime1">
               <a:rPr lang="fr-FR" smtClean="0"/>
-              <a:t>23/12/2025</a:t>
+              <a:t>24/12/2025</a:t>
             </a:fld>
             <a:endParaRPr lang="fr-FR"/>
           </a:p>
@@ -2166,7 +4682,7 @@
           <a:p>
             <a:fld id="{A10BF9B0-6586-4FA1-AD3E-0405E600628A}" type="datetime1">
               <a:rPr lang="fr-FR" smtClean="0"/>
-              <a:t>23/12/2025</a:t>
+              <a:t>24/12/2025</a:t>
             </a:fld>
             <a:endParaRPr lang="fr-FR"/>
           </a:p>
@@ -2307,7 +4823,7 @@
           <a:p>
             <a:fld id="{5AC7FDFF-27F4-416C-AAA5-054C421B7E35}" type="datetime1">
               <a:rPr lang="fr-FR" smtClean="0"/>
-              <a:t>23/12/2025</a:t>
+              <a:t>24/12/2025</a:t>
             </a:fld>
             <a:endParaRPr lang="fr-FR"/>
           </a:p>
@@ -2420,7 +4936,7 @@
           <a:p>
             <a:fld id="{FFD1D1DD-9E54-4704-9474-D58B50ABEC96}" type="datetime1">
               <a:rPr lang="fr-FR" smtClean="0"/>
-              <a:t>23/12/2025</a:t>
+              <a:t>24/12/2025</a:t>
             </a:fld>
             <a:endParaRPr lang="fr-FR"/>
           </a:p>
@@ -2731,7 +5247,7 @@
           <a:p>
             <a:fld id="{1A05297F-3CAB-463D-92DC-DBAC52BC76D8}" type="datetime1">
               <a:rPr lang="fr-FR" smtClean="0"/>
-              <a:t>23/12/2025</a:t>
+              <a:t>24/12/2025</a:t>
             </a:fld>
             <a:endParaRPr lang="fr-FR"/>
           </a:p>
@@ -3019,7 +5535,7 @@
           <a:p>
             <a:fld id="{78A6C159-C286-4F72-8EC5-4597CF01607E}" type="datetime1">
               <a:rPr lang="fr-FR" smtClean="0"/>
-              <a:t>23/12/2025</a:t>
+              <a:t>24/12/2025</a:t>
             </a:fld>
             <a:endParaRPr lang="fr-FR"/>
           </a:p>
@@ -3260,7 +5776,7 @@
           <a:p>
             <a:fld id="{04EAD4E5-CEC9-481A-97C7-CE2D7FC2BFAC}" type="datetime1">
               <a:rPr lang="fr-FR" smtClean="0"/>
-              <a:t>23/12/2025</a:t>
+              <a:t>24/12/2025</a:t>
             </a:fld>
             <a:endParaRPr lang="fr-FR"/>
           </a:p>
@@ -4700,6 +7216,715 @@
   <p:cSld>
     <p:spTree>
       <p:nvGrpSpPr>
+        <p:cNvPr id="1" name="">
+          <a:extLst>
+            <a:ext uri="{FF2B5EF4-FFF2-40B4-BE49-F238E27FC236}">
+              <a16:creationId xmlns:a16="http://schemas.microsoft.com/office/drawing/2014/main" id="{C65DABC7-65F1-5814-C3CD-96027E8F621B}"/>
+            </a:ext>
+          </a:extLst>
+        </p:cNvPr>
+        <p:cNvGrpSpPr/>
+        <p:nvPr/>
+      </p:nvGrpSpPr>
+      <p:grpSpPr>
+        <a:xfrm>
+          <a:off x="0" y="0"/>
+          <a:ext cx="0" cy="0"/>
+          <a:chOff x="0" y="0"/>
+          <a:chExt cx="0" cy="0"/>
+        </a:xfrm>
+      </p:grpSpPr>
+      <p:sp>
+        <p:nvSpPr>
+          <p:cNvPr id="2" name="Titre 1">
+            <a:extLst>
+              <a:ext uri="{FF2B5EF4-FFF2-40B4-BE49-F238E27FC236}">
+                <a16:creationId xmlns:a16="http://schemas.microsoft.com/office/drawing/2014/main" id="{4B91BFAE-D11B-19C7-4E4C-46C7B223C2B1}"/>
+              </a:ext>
+            </a:extLst>
+          </p:cNvPr>
+          <p:cNvSpPr>
+            <a:spLocks noGrp="1"/>
+          </p:cNvSpPr>
+          <p:nvPr>
+            <p:ph type="title"/>
+          </p:nvPr>
+        </p:nvSpPr>
+        <p:spPr/>
+        <p:txBody>
+          <a:bodyPr>
+            <a:normAutofit/>
+          </a:bodyPr>
+          <a:lstStyle/>
+          <a:p>
+            <a:r>
+              <a:rPr lang="fr-FR" dirty="0">
+                <a:latin typeface="Daytona" panose="020B0604030500040204" pitchFamily="34" charset="0"/>
+              </a:rPr>
+              <a:t>Data model</a:t>
+            </a:r>
+            <a:br>
+              <a:rPr lang="fr-FR" dirty="0">
+                <a:latin typeface="Daytona" panose="020B0604030500040204" pitchFamily="34" charset="0"/>
+              </a:rPr>
+            </a:br>
+            <a:r>
+              <a:rPr lang="fr-FR" dirty="0">
+                <a:latin typeface="Daytona" panose="020B0604030500040204" pitchFamily="34" charset="0"/>
+              </a:rPr>
+              <a:t>V0.01</a:t>
+            </a:r>
+          </a:p>
+        </p:txBody>
+      </p:sp>
+      <p:graphicFrame>
+        <p:nvGraphicFramePr>
+          <p:cNvPr id="8" name="Tableau 7">
+            <a:extLst>
+              <a:ext uri="{FF2B5EF4-FFF2-40B4-BE49-F238E27FC236}">
+                <a16:creationId xmlns:a16="http://schemas.microsoft.com/office/drawing/2014/main" id="{1EE81099-F8D5-7443-2D76-BEB8A0C17CEE}"/>
+              </a:ext>
+            </a:extLst>
+          </p:cNvPr>
+          <p:cNvGraphicFramePr>
+            <a:graphicFrameLocks noGrp="1"/>
+          </p:cNvGraphicFramePr>
+          <p:nvPr>
+            <p:extLst>
+              <p:ext uri="{D42A27DB-BD31-4B8C-83A1-F6EECF244321}">
+                <p14:modId xmlns:p14="http://schemas.microsoft.com/office/powerpoint/2010/main" val="1883320910"/>
+              </p:ext>
+            </p:extLst>
+          </p:nvPr>
+        </p:nvGraphicFramePr>
+        <p:xfrm>
+          <a:off x="2551974" y="2296295"/>
+          <a:ext cx="2042160" cy="3200400"/>
+        </p:xfrm>
+        <a:graphic>
+          <a:graphicData uri="http://schemas.openxmlformats.org/drawingml/2006/table">
+            <a:tbl>
+              <a:tblPr firstRow="1" bandRow="1">
+                <a:tableStyleId>{5C22544A-7EE6-4342-B048-85BDC9FD1C3A}</a:tableStyleId>
+              </a:tblPr>
+              <a:tblGrid>
+                <a:gridCol w="2042160">
+                  <a:extLst>
+                    <a:ext uri="{9D8B030D-6E8A-4147-A177-3AD203B41FA5}">
+                      <a16:colId xmlns:a16="http://schemas.microsoft.com/office/drawing/2014/main" val="1516608136"/>
+                    </a:ext>
+                  </a:extLst>
+                </a:gridCol>
+              </a:tblGrid>
+              <a:tr h="330812">
+                <a:tc>
+                  <a:txBody>
+                    <a:bodyPr/>
+                    <a:lstStyle/>
+                    <a:p>
+                      <a:pPr algn="ctr"/>
+                      <a:r>
+                        <a:rPr lang="fr-FR" dirty="0"/>
+                        <a:t>Events</a:t>
+                      </a:r>
+                    </a:p>
+                  </a:txBody>
+                  <a:tcPr>
+                    <a:solidFill>
+                      <a:srgbClr val="0070C0"/>
+                    </a:solidFill>
+                  </a:tcPr>
+                </a:tc>
+                <a:extLst>
+                  <a:ext uri="{0D108BD9-81ED-4DB2-BD59-A6C34878D82A}">
+                    <a16:rowId xmlns:a16="http://schemas.microsoft.com/office/drawing/2014/main" val="1200805338"/>
+                  </a:ext>
+                </a:extLst>
+              </a:tr>
+              <a:tr h="370840">
+                <a:tc>
+                  <a:txBody>
+                    <a:bodyPr/>
+                    <a:lstStyle/>
+                    <a:p>
+                      <a:pPr algn="ctr"/>
+                      <a:r>
+                        <a:rPr lang="fr-FR" dirty="0" err="1"/>
+                        <a:t>Event_id</a:t>
+                      </a:r>
+                      <a:endParaRPr lang="fr-FR" dirty="0"/>
+                    </a:p>
+                    <a:p>
+                      <a:pPr algn="ctr"/>
+                      <a:r>
+                        <a:rPr lang="fr-FR" dirty="0"/>
+                        <a:t>url</a:t>
+                      </a:r>
+                    </a:p>
+                    <a:p>
+                      <a:pPr algn="ctr"/>
+                      <a:r>
+                        <a:rPr lang="fr-FR" dirty="0" err="1"/>
+                        <a:t>Title</a:t>
+                      </a:r>
+                      <a:endParaRPr lang="fr-FR" dirty="0"/>
+                    </a:p>
+                    <a:p>
+                      <a:pPr algn="ctr"/>
+                      <a:r>
+                        <a:rPr lang="fr-FR" dirty="0"/>
+                        <a:t>Description</a:t>
+                      </a:r>
+                    </a:p>
+                    <a:p>
+                      <a:pPr algn="ctr"/>
+                      <a:r>
+                        <a:rPr lang="fr-FR" dirty="0" err="1"/>
+                        <a:t>Date_start</a:t>
+                      </a:r>
+                      <a:endParaRPr lang="fr-FR" dirty="0"/>
+                    </a:p>
+                    <a:p>
+                      <a:pPr algn="ctr"/>
+                      <a:r>
+                        <a:rPr lang="fr-FR" dirty="0" err="1"/>
+                        <a:t>Date_end</a:t>
+                      </a:r>
+                      <a:endParaRPr lang="fr-FR" dirty="0"/>
+                    </a:p>
+                    <a:p>
+                      <a:pPr algn="ctr"/>
+                      <a:r>
+                        <a:rPr lang="fr-FR" dirty="0" err="1"/>
+                        <a:t>Updated_at</a:t>
+                      </a:r>
+                      <a:endParaRPr lang="fr-FR" dirty="0"/>
+                    </a:p>
+                    <a:p>
+                      <a:pPr algn="ctr"/>
+                      <a:r>
+                        <a:rPr lang="fr-FR" dirty="0" err="1"/>
+                        <a:t>Location_id</a:t>
+                      </a:r>
+                      <a:endParaRPr lang="fr-FR" dirty="0"/>
+                    </a:p>
+                    <a:p>
+                      <a:pPr algn="ctr"/>
+                      <a:r>
+                        <a:rPr lang="fr-FR" sz="1800" b="0" kern="1200" dirty="0" err="1">
+                          <a:solidFill>
+                            <a:schemeClr val="dk1"/>
+                          </a:solidFill>
+                          <a:effectLst/>
+                          <a:latin typeface="+mn-lt"/>
+                          <a:ea typeface="+mn-ea"/>
+                          <a:cs typeface="+mn-cs"/>
+                        </a:rPr>
+                        <a:t>flag_interest</a:t>
+                      </a:r>
+                      <a:endParaRPr lang="fr-FR" sz="1800" b="0" kern="1200" dirty="0">
+                        <a:solidFill>
+                          <a:schemeClr val="dk1"/>
+                        </a:solidFill>
+                        <a:effectLst/>
+                        <a:latin typeface="+mn-lt"/>
+                        <a:ea typeface="+mn-ea"/>
+                        <a:cs typeface="+mn-cs"/>
+                      </a:endParaRPr>
+                    </a:p>
+                    <a:p>
+                      <a:pPr algn="ctr"/>
+                      <a:r>
+                        <a:rPr lang="fr-FR" sz="1800" b="0" kern="1200" dirty="0" err="1">
+                          <a:solidFill>
+                            <a:schemeClr val="dk1"/>
+                          </a:solidFill>
+                          <a:effectLst/>
+                          <a:latin typeface="+mn-lt"/>
+                          <a:ea typeface="+mn-ea"/>
+                          <a:cs typeface="+mn-cs"/>
+                        </a:rPr>
+                        <a:t>flag_new</a:t>
+                      </a:r>
+                      <a:endParaRPr lang="fr-FR" sz="1800" b="0" kern="1200" dirty="0">
+                        <a:solidFill>
+                          <a:schemeClr val="dk1"/>
+                        </a:solidFill>
+                        <a:effectLst/>
+                        <a:latin typeface="+mn-lt"/>
+                        <a:ea typeface="+mn-ea"/>
+                        <a:cs typeface="+mn-cs"/>
+                      </a:endParaRPr>
+                    </a:p>
+                  </a:txBody>
+                  <a:tcPr/>
+                </a:tc>
+                <a:extLst>
+                  <a:ext uri="{0D108BD9-81ED-4DB2-BD59-A6C34878D82A}">
+                    <a16:rowId xmlns:a16="http://schemas.microsoft.com/office/drawing/2014/main" val="2098980139"/>
+                  </a:ext>
+                </a:extLst>
+              </a:tr>
+            </a:tbl>
+          </a:graphicData>
+        </a:graphic>
+      </p:graphicFrame>
+      <p:graphicFrame>
+        <p:nvGraphicFramePr>
+          <p:cNvPr id="10" name="Tableau 9">
+            <a:extLst>
+              <a:ext uri="{FF2B5EF4-FFF2-40B4-BE49-F238E27FC236}">
+                <a16:creationId xmlns:a16="http://schemas.microsoft.com/office/drawing/2014/main" id="{0E904F2D-7220-7E16-6FD8-2B8C5DAE9924}"/>
+              </a:ext>
+            </a:extLst>
+          </p:cNvPr>
+          <p:cNvGraphicFramePr>
+            <a:graphicFrameLocks noGrp="1"/>
+          </p:cNvGraphicFramePr>
+          <p:nvPr>
+            <p:extLst>
+              <p:ext uri="{D42A27DB-BD31-4B8C-83A1-F6EECF244321}">
+                <p14:modId xmlns:p14="http://schemas.microsoft.com/office/powerpoint/2010/main" val="1661362018"/>
+              </p:ext>
+            </p:extLst>
+          </p:nvPr>
+        </p:nvGraphicFramePr>
+        <p:xfrm>
+          <a:off x="7932202" y="2844935"/>
+          <a:ext cx="2265680" cy="2103120"/>
+        </p:xfrm>
+        <a:graphic>
+          <a:graphicData uri="http://schemas.openxmlformats.org/drawingml/2006/table">
+            <a:tbl>
+              <a:tblPr firstRow="1" bandRow="1">
+                <a:tableStyleId>{5C22544A-7EE6-4342-B048-85BDC9FD1C3A}</a:tableStyleId>
+              </a:tblPr>
+              <a:tblGrid>
+                <a:gridCol w="2265680">
+                  <a:extLst>
+                    <a:ext uri="{9D8B030D-6E8A-4147-A177-3AD203B41FA5}">
+                      <a16:colId xmlns:a16="http://schemas.microsoft.com/office/drawing/2014/main" val="1516608136"/>
+                    </a:ext>
+                  </a:extLst>
+                </a:gridCol>
+              </a:tblGrid>
+              <a:tr h="0">
+                <a:tc>
+                  <a:txBody>
+                    <a:bodyPr/>
+                    <a:lstStyle/>
+                    <a:p>
+                      <a:pPr algn="ctr"/>
+                      <a:r>
+                        <a:rPr lang="fr-FR" dirty="0"/>
+                        <a:t>Location </a:t>
+                      </a:r>
+                    </a:p>
+                  </a:txBody>
+                  <a:tcPr>
+                    <a:solidFill>
+                      <a:srgbClr val="FF0000"/>
+                    </a:solidFill>
+                  </a:tcPr>
+                </a:tc>
+                <a:extLst>
+                  <a:ext uri="{0D108BD9-81ED-4DB2-BD59-A6C34878D82A}">
+                    <a16:rowId xmlns:a16="http://schemas.microsoft.com/office/drawing/2014/main" val="1200805338"/>
+                  </a:ext>
+                </a:extLst>
+              </a:tr>
+              <a:tr h="370840">
+                <a:tc>
+                  <a:txBody>
+                    <a:bodyPr/>
+                    <a:lstStyle/>
+                    <a:p>
+                      <a:pPr algn="ctr"/>
+                      <a:r>
+                        <a:rPr lang="fr-FR" dirty="0"/>
+                        <a:t> </a:t>
+                      </a:r>
+                      <a:r>
+                        <a:rPr lang="fr-FR" dirty="0" err="1"/>
+                        <a:t>Location_id</a:t>
+                      </a:r>
+                      <a:endParaRPr lang="fr-FR" dirty="0"/>
+                    </a:p>
+                    <a:p>
+                      <a:pPr algn="ctr"/>
+                      <a:r>
+                        <a:rPr lang="fr-FR" dirty="0" err="1"/>
+                        <a:t>Address_name</a:t>
+                      </a:r>
+                      <a:endParaRPr lang="fr-FR" dirty="0"/>
+                    </a:p>
+                    <a:p>
+                      <a:pPr algn="ctr"/>
+                      <a:r>
+                        <a:rPr lang="fr-FR" dirty="0" err="1"/>
+                        <a:t>Address_city</a:t>
+                      </a:r>
+                      <a:endParaRPr lang="fr-FR" dirty="0"/>
+                    </a:p>
+                    <a:p>
+                      <a:pPr algn="ctr"/>
+                      <a:r>
+                        <a:rPr lang="fr-FR" dirty="0" err="1"/>
+                        <a:t>Address_zipcode</a:t>
+                      </a:r>
+                      <a:endParaRPr lang="fr-FR" dirty="0"/>
+                    </a:p>
+                    <a:p>
+                      <a:pPr algn="ctr"/>
+                      <a:r>
+                        <a:rPr lang="fr-FR" dirty="0" err="1"/>
+                        <a:t>Lat_long</a:t>
+                      </a:r>
+                      <a:endParaRPr lang="fr-FR" dirty="0"/>
+                    </a:p>
+                    <a:p>
+                      <a:pPr algn="ctr"/>
+                      <a:r>
+                        <a:rPr lang="fr-FR" dirty="0" err="1"/>
+                        <a:t>fcard</a:t>
+                      </a:r>
+                      <a:endParaRPr lang="fr-FR" dirty="0"/>
+                    </a:p>
+                  </a:txBody>
+                  <a:tcPr/>
+                </a:tc>
+                <a:extLst>
+                  <a:ext uri="{0D108BD9-81ED-4DB2-BD59-A6C34878D82A}">
+                    <a16:rowId xmlns:a16="http://schemas.microsoft.com/office/drawing/2014/main" val="2098980139"/>
+                  </a:ext>
+                </a:extLst>
+              </a:tr>
+            </a:tbl>
+          </a:graphicData>
+        </a:graphic>
+      </p:graphicFrame>
+      <p:sp>
+        <p:nvSpPr>
+          <p:cNvPr id="12" name="Espace réservé du numéro de diapositive 11">
+            <a:extLst>
+              <a:ext uri="{FF2B5EF4-FFF2-40B4-BE49-F238E27FC236}">
+                <a16:creationId xmlns:a16="http://schemas.microsoft.com/office/drawing/2014/main" id="{94398441-D567-B6C0-22E3-109CAFD8989F}"/>
+              </a:ext>
+            </a:extLst>
+          </p:cNvPr>
+          <p:cNvSpPr>
+            <a:spLocks noGrp="1"/>
+          </p:cNvSpPr>
+          <p:nvPr>
+            <p:ph type="sldNum" sz="quarter" idx="12"/>
+          </p:nvPr>
+        </p:nvSpPr>
+        <p:spPr/>
+        <p:txBody>
+          <a:bodyPr/>
+          <a:lstStyle/>
+          <a:p>
+            <a:fld id="{6997B004-CFCE-48D1-9298-DADD64B1EF73}" type="slidenum">
+              <a:rPr lang="fr-FR" smtClean="0"/>
+              <a:t>5</a:t>
+            </a:fld>
+            <a:endParaRPr lang="fr-FR"/>
+          </a:p>
+        </p:txBody>
+      </p:sp>
+      <p:cxnSp>
+        <p:nvCxnSpPr>
+          <p:cNvPr id="15" name="Connecteur droit 14">
+            <a:extLst>
+              <a:ext uri="{FF2B5EF4-FFF2-40B4-BE49-F238E27FC236}">
+                <a16:creationId xmlns:a16="http://schemas.microsoft.com/office/drawing/2014/main" id="{1B5B493A-0702-B02B-D209-236C6EB59760}"/>
+              </a:ext>
+            </a:extLst>
+          </p:cNvPr>
+          <p:cNvCxnSpPr>
+            <a:cxnSpLocks/>
+            <a:stCxn id="10" idx="1"/>
+            <a:endCxn id="8" idx="3"/>
+          </p:cNvCxnSpPr>
+          <p:nvPr/>
+        </p:nvCxnSpPr>
+        <p:spPr>
+          <a:xfrm flipH="1">
+            <a:off x="4594134" y="3896495"/>
+            <a:ext cx="3338068" cy="0"/>
+          </a:xfrm>
+          <a:prstGeom prst="line">
+            <a:avLst/>
+          </a:prstGeom>
+        </p:spPr>
+        <p:style>
+          <a:lnRef idx="2">
+            <a:schemeClr val="accent1"/>
+          </a:lnRef>
+          <a:fillRef idx="0">
+            <a:schemeClr val="accent1"/>
+          </a:fillRef>
+          <a:effectRef idx="1">
+            <a:schemeClr val="accent1"/>
+          </a:effectRef>
+          <a:fontRef idx="minor">
+            <a:schemeClr val="tx1"/>
+          </a:fontRef>
+        </p:style>
+      </p:cxnSp>
+      <p:pic>
+        <p:nvPicPr>
+          <p:cNvPr id="74" name="Image 73" descr="Une image contenant Graphique, symbole, Police, graphisme&#10;&#10;Le contenu généré par l’IA peut être incorrect.">
+            <a:extLst>
+              <a:ext uri="{FF2B5EF4-FFF2-40B4-BE49-F238E27FC236}">
+                <a16:creationId xmlns:a16="http://schemas.microsoft.com/office/drawing/2014/main" id="{6F272B34-1324-47B6-2868-EF1BCD0062BF}"/>
+              </a:ext>
+            </a:extLst>
+          </p:cNvPr>
+          <p:cNvPicPr>
+            <a:picLocks noChangeAspect="1"/>
+          </p:cNvPicPr>
+          <p:nvPr/>
+        </p:nvPicPr>
+        <p:blipFill>
+          <a:blip r:embed="rId2">
+            <a:extLst>
+              <a:ext uri="{28A0092B-C50C-407E-A947-70E740481C1C}">
+                <a14:useLocalDpi xmlns:a14="http://schemas.microsoft.com/office/drawing/2010/main" val="0"/>
+              </a:ext>
+            </a:extLst>
+          </a:blip>
+          <a:stretch>
+            <a:fillRect/>
+          </a:stretch>
+        </p:blipFill>
+        <p:spPr>
+          <a:xfrm rot="3830787">
+            <a:off x="9300373" y="-106001"/>
+            <a:ext cx="767628" cy="767628"/>
+          </a:xfrm>
+          <a:prstGeom prst="rect">
+            <a:avLst/>
+          </a:prstGeom>
+        </p:spPr>
+      </p:pic>
+      <p:pic>
+        <p:nvPicPr>
+          <p:cNvPr id="76" name="Image 75" descr="Une image contenant logo, symbole, Graphique, Police&#10;&#10;Le contenu généré par l’IA peut être incorrect.">
+            <a:extLst>
+              <a:ext uri="{FF2B5EF4-FFF2-40B4-BE49-F238E27FC236}">
+                <a16:creationId xmlns:a16="http://schemas.microsoft.com/office/drawing/2014/main" id="{3FA05A07-364B-7D9F-5F86-7F72DB39CCCB}"/>
+              </a:ext>
+            </a:extLst>
+          </p:cNvPr>
+          <p:cNvPicPr>
+            <a:picLocks noChangeAspect="1"/>
+          </p:cNvPicPr>
+          <p:nvPr/>
+        </p:nvPicPr>
+        <p:blipFill>
+          <a:blip r:embed="rId3">
+            <a:extLst>
+              <a:ext uri="{28A0092B-C50C-407E-A947-70E740481C1C}">
+                <a14:useLocalDpi xmlns:a14="http://schemas.microsoft.com/office/drawing/2010/main" val="0"/>
+              </a:ext>
+            </a:extLst>
+          </a:blip>
+          <a:stretch>
+            <a:fillRect/>
+          </a:stretch>
+        </p:blipFill>
+        <p:spPr>
+          <a:xfrm rot="18961946" flipH="1">
+            <a:off x="8010952" y="-151956"/>
+            <a:ext cx="859536" cy="859536"/>
+          </a:xfrm>
+          <a:prstGeom prst="rect">
+            <a:avLst/>
+          </a:prstGeom>
+        </p:spPr>
+      </p:pic>
+      <p:sp>
+        <p:nvSpPr>
+          <p:cNvPr id="77" name="ZoneTexte 76">
+            <a:extLst>
+              <a:ext uri="{FF2B5EF4-FFF2-40B4-BE49-F238E27FC236}">
+                <a16:creationId xmlns:a16="http://schemas.microsoft.com/office/drawing/2014/main" id="{1CA8B2FD-2D10-09DA-4B1F-3055FA22C7EA}"/>
+              </a:ext>
+            </a:extLst>
+          </p:cNvPr>
+          <p:cNvSpPr txBox="1"/>
+          <p:nvPr/>
+        </p:nvSpPr>
+        <p:spPr>
+          <a:xfrm>
+            <a:off x="7833036" y="523256"/>
+            <a:ext cx="3116396" cy="307777"/>
+          </a:xfrm>
+          <a:prstGeom prst="rect">
+            <a:avLst/>
+          </a:prstGeom>
+          <a:noFill/>
+        </p:spPr>
+        <p:txBody>
+          <a:bodyPr wrap="square" rtlCol="0">
+            <a:spAutoFit/>
+          </a:bodyPr>
+          <a:lstStyle/>
+          <a:p>
+            <a:r>
+              <a:rPr lang="fr-FR" sz="1400" dirty="0" err="1">
+                <a:latin typeface="Daytona" panose="020B0604030500040204" pitchFamily="34" charset="0"/>
+              </a:rPr>
+              <a:t>Primary</a:t>
+            </a:r>
+            <a:r>
+              <a:rPr lang="fr-FR" sz="1400" dirty="0">
+                <a:latin typeface="Daytona" panose="020B0604030500040204" pitchFamily="34" charset="0"/>
+              </a:rPr>
+              <a:t> key       </a:t>
+            </a:r>
+            <a:r>
+              <a:rPr lang="fr-FR" sz="1400" dirty="0" err="1">
+                <a:latin typeface="Daytona" panose="020B0604030500040204" pitchFamily="34" charset="0"/>
+              </a:rPr>
+              <a:t>Foreign</a:t>
+            </a:r>
+            <a:r>
+              <a:rPr lang="fr-FR" sz="1400" dirty="0">
+                <a:latin typeface="Daytona" panose="020B0604030500040204" pitchFamily="34" charset="0"/>
+              </a:rPr>
+              <a:t> key</a:t>
+            </a:r>
+          </a:p>
+        </p:txBody>
+      </p:sp>
+      <p:pic>
+        <p:nvPicPr>
+          <p:cNvPr id="79" name="Image 78" descr="Une image contenant logo, symbole, Graphique, Police&#10;&#10;Le contenu généré par l’IA peut être incorrect.">
+            <a:extLst>
+              <a:ext uri="{FF2B5EF4-FFF2-40B4-BE49-F238E27FC236}">
+                <a16:creationId xmlns:a16="http://schemas.microsoft.com/office/drawing/2014/main" id="{57D60CC9-B481-3138-20AF-D1F88FBC2AB6}"/>
+              </a:ext>
+            </a:extLst>
+          </p:cNvPr>
+          <p:cNvPicPr>
+            <a:picLocks noChangeAspect="1"/>
+          </p:cNvPicPr>
+          <p:nvPr/>
+        </p:nvPicPr>
+        <p:blipFill>
+          <a:blip r:embed="rId3">
+            <a:extLst>
+              <a:ext uri="{28A0092B-C50C-407E-A947-70E740481C1C}">
+                <a14:useLocalDpi xmlns:a14="http://schemas.microsoft.com/office/drawing/2010/main" val="0"/>
+              </a:ext>
+            </a:extLst>
+          </a:blip>
+          <a:stretch>
+            <a:fillRect/>
+          </a:stretch>
+        </p:blipFill>
+        <p:spPr>
+          <a:xfrm rot="18961946" flipH="1">
+            <a:off x="4103141" y="2647549"/>
+            <a:ext cx="504282" cy="504282"/>
+          </a:xfrm>
+          <a:prstGeom prst="rect">
+            <a:avLst/>
+          </a:prstGeom>
+        </p:spPr>
+      </p:pic>
+      <p:pic>
+        <p:nvPicPr>
+          <p:cNvPr id="80" name="Image 79" descr="Une image contenant logo, symbole, Graphique, Police&#10;&#10;Le contenu généré par l’IA peut être incorrect.">
+            <a:extLst>
+              <a:ext uri="{FF2B5EF4-FFF2-40B4-BE49-F238E27FC236}">
+                <a16:creationId xmlns:a16="http://schemas.microsoft.com/office/drawing/2014/main" id="{ACD6873D-B653-003D-5F27-230A1B852764}"/>
+              </a:ext>
+            </a:extLst>
+          </p:cNvPr>
+          <p:cNvPicPr>
+            <a:picLocks noChangeAspect="1"/>
+          </p:cNvPicPr>
+          <p:nvPr/>
+        </p:nvPicPr>
+        <p:blipFill>
+          <a:blip r:embed="rId3">
+            <a:extLst>
+              <a:ext uri="{28A0092B-C50C-407E-A947-70E740481C1C}">
+                <a14:useLocalDpi xmlns:a14="http://schemas.microsoft.com/office/drawing/2010/main" val="0"/>
+              </a:ext>
+            </a:extLst>
+          </a:blip>
+          <a:stretch>
+            <a:fillRect/>
+          </a:stretch>
+        </p:blipFill>
+        <p:spPr>
+          <a:xfrm rot="18961946" flipH="1">
+            <a:off x="9589218" y="3712674"/>
+            <a:ext cx="504282" cy="504282"/>
+          </a:xfrm>
+          <a:prstGeom prst="rect">
+            <a:avLst/>
+          </a:prstGeom>
+        </p:spPr>
+      </p:pic>
+      <p:pic>
+        <p:nvPicPr>
+          <p:cNvPr id="83" name="Image 82" descr="Une image contenant Graphique, symbole, Police, graphisme&#10;&#10;Le contenu généré par l’IA peut être incorrect.">
+            <a:extLst>
+              <a:ext uri="{FF2B5EF4-FFF2-40B4-BE49-F238E27FC236}">
+                <a16:creationId xmlns:a16="http://schemas.microsoft.com/office/drawing/2014/main" id="{1369E4F6-DA2F-6E14-347F-A3B81D22669F}"/>
+              </a:ext>
+            </a:extLst>
+          </p:cNvPr>
+          <p:cNvPicPr>
+            <a:picLocks noChangeAspect="1"/>
+          </p:cNvPicPr>
+          <p:nvPr/>
+        </p:nvPicPr>
+        <p:blipFill>
+          <a:blip r:embed="rId2">
+            <a:extLst>
+              <a:ext uri="{28A0092B-C50C-407E-A947-70E740481C1C}">
+                <a14:useLocalDpi xmlns:a14="http://schemas.microsoft.com/office/drawing/2010/main" val="0"/>
+              </a:ext>
+            </a:extLst>
+          </a:blip>
+          <a:stretch>
+            <a:fillRect/>
+          </a:stretch>
+        </p:blipFill>
+        <p:spPr>
+          <a:xfrm rot="3830787">
+            <a:off x="4116792" y="4555513"/>
+            <a:ext cx="472096" cy="472096"/>
+          </a:xfrm>
+          <a:prstGeom prst="rect">
+            <a:avLst/>
+          </a:prstGeom>
+        </p:spPr>
+      </p:pic>
+    </p:spTree>
+    <p:extLst>
+      <p:ext uri="{BB962C8B-B14F-4D97-AF65-F5344CB8AC3E}">
+        <p14:creationId xmlns:p14="http://schemas.microsoft.com/office/powerpoint/2010/main" val="2629751167"/>
+      </p:ext>
+    </p:extLst>
+  </p:cSld>
+  <p:clrMapOvr>
+    <a:masterClrMapping/>
+  </p:clrMapOvr>
+</p:sld>
+</file>
+
+<file path=ppt/slides/slide6.xml><?xml version="1.0" encoding="utf-8"?>
+<p:sld xmlns:a="http://schemas.openxmlformats.org/drawingml/2006/main" xmlns:r="http://schemas.openxmlformats.org/officeDocument/2006/relationships" xmlns:p="http://schemas.openxmlformats.org/presentationml/2006/main">
+  <p:cSld>
+    <p:spTree>
+      <p:nvGrpSpPr>
         <p:cNvPr id="1" name=""/>
         <p:cNvGrpSpPr/>
         <p:nvPr/>
@@ -5015,7 +8240,7 @@
           <p:nvPr>
             <p:extLst>
               <p:ext uri="{D42A27DB-BD31-4B8C-83A1-F6EECF244321}">
-                <p14:modId xmlns:p14="http://schemas.microsoft.com/office/powerpoint/2010/main" val="3804198302"/>
+                <p14:modId xmlns:p14="http://schemas.microsoft.com/office/powerpoint/2010/main" val="2623937906"/>
               </p:ext>
             </p:extLst>
           </p:nvPr>
@@ -5077,7 +8302,7 @@
                       </a:r>
                       <a:r>
                         <a:rPr lang="fr-FR" dirty="0" err="1"/>
-                        <a:t>Locations_id</a:t>
+                        <a:t>Location_id</a:t>
                       </a:r>
                       <a:endParaRPr lang="fr-FR" dirty="0"/>
                     </a:p>
@@ -5256,7 +8481,7 @@
           <a:p>
             <a:fld id="{6997B004-CFCE-48D1-9298-DADD64B1EF73}" type="slidenum">
               <a:rPr lang="fr-FR" smtClean="0"/>
-              <a:t>5</a:t>
+              <a:t>6</a:t>
             </a:fld>
             <a:endParaRPr lang="fr-FR"/>
           </a:p>
@@ -6231,6 +9456,155 @@
     <p:extLst>
       <p:ext uri="{BB962C8B-B14F-4D97-AF65-F5344CB8AC3E}">
         <p14:creationId xmlns:p14="http://schemas.microsoft.com/office/powerpoint/2010/main" val="2293294775"/>
+      </p:ext>
+    </p:extLst>
+  </p:cSld>
+  <p:clrMapOvr>
+    <a:masterClrMapping/>
+  </p:clrMapOvr>
+</p:sld>
+</file>
+
+<file path=ppt/slides/slide7.xml><?xml version="1.0" encoding="utf-8"?>
+<p:sld xmlns:a="http://schemas.openxmlformats.org/drawingml/2006/main" xmlns:r="http://schemas.openxmlformats.org/officeDocument/2006/relationships" xmlns:p="http://schemas.openxmlformats.org/presentationml/2006/main">
+  <p:cSld>
+    <p:spTree>
+      <p:nvGrpSpPr>
+        <p:cNvPr id="1" name="">
+          <a:extLst>
+            <a:ext uri="{FF2B5EF4-FFF2-40B4-BE49-F238E27FC236}">
+              <a16:creationId xmlns:a16="http://schemas.microsoft.com/office/drawing/2014/main" id="{4EEAB5E7-C3EA-4C4C-E8BD-E538BDC6A947}"/>
+            </a:ext>
+          </a:extLst>
+        </p:cNvPr>
+        <p:cNvGrpSpPr/>
+        <p:nvPr/>
+      </p:nvGrpSpPr>
+      <p:grpSpPr>
+        <a:xfrm>
+          <a:off x="0" y="0"/>
+          <a:ext cx="0" cy="0"/>
+          <a:chOff x="0" y="0"/>
+          <a:chExt cx="0" cy="0"/>
+        </a:xfrm>
+      </p:grpSpPr>
+      <p:sp>
+        <p:nvSpPr>
+          <p:cNvPr id="2" name="Titre 1">
+            <a:extLst>
+              <a:ext uri="{FF2B5EF4-FFF2-40B4-BE49-F238E27FC236}">
+                <a16:creationId xmlns:a16="http://schemas.microsoft.com/office/drawing/2014/main" id="{C57629D2-3683-9002-8C83-15FE9D74768F}"/>
+              </a:ext>
+            </a:extLst>
+          </p:cNvPr>
+          <p:cNvSpPr>
+            <a:spLocks noGrp="1"/>
+          </p:cNvSpPr>
+          <p:nvPr>
+            <p:ph type="title"/>
+          </p:nvPr>
+        </p:nvSpPr>
+        <p:spPr/>
+        <p:txBody>
+          <a:bodyPr>
+            <a:normAutofit/>
+          </a:bodyPr>
+          <a:lstStyle/>
+          <a:p>
+            <a:r>
+              <a:rPr lang="fr-FR" dirty="0">
+                <a:latin typeface="Daytona" panose="020B0604030500040204" pitchFamily="34" charset="0"/>
+              </a:rPr>
+              <a:t>New </a:t>
+            </a:r>
+            <a:r>
+              <a:rPr lang="fr-FR" dirty="0" err="1">
+                <a:latin typeface="Daytona" panose="020B0604030500040204" pitchFamily="34" charset="0"/>
+              </a:rPr>
+              <a:t>event</a:t>
+            </a:r>
+            <a:r>
+              <a:rPr lang="fr-FR" dirty="0">
+                <a:latin typeface="Daytona" panose="020B0604030500040204" pitchFamily="34" charset="0"/>
+              </a:rPr>
+              <a:t> </a:t>
+            </a:r>
+            <a:r>
+              <a:rPr lang="fr-FR" dirty="0" err="1">
+                <a:latin typeface="Daytona" panose="020B0604030500040204" pitchFamily="34" charset="0"/>
+              </a:rPr>
+              <a:t>incoming</a:t>
+            </a:r>
+            <a:r>
+              <a:rPr lang="fr-FR" dirty="0">
+                <a:latin typeface="Daytona" panose="020B0604030500040204" pitchFamily="34" charset="0"/>
+              </a:rPr>
+              <a:t> ? </a:t>
+            </a:r>
+          </a:p>
+        </p:txBody>
+      </p:sp>
+      <p:sp>
+        <p:nvSpPr>
+          <p:cNvPr id="12" name="Espace réservé du numéro de diapositive 11">
+            <a:extLst>
+              <a:ext uri="{FF2B5EF4-FFF2-40B4-BE49-F238E27FC236}">
+                <a16:creationId xmlns:a16="http://schemas.microsoft.com/office/drawing/2014/main" id="{F0786BB1-467A-3C0C-CE31-EC225AA41F57}"/>
+              </a:ext>
+            </a:extLst>
+          </p:cNvPr>
+          <p:cNvSpPr>
+            <a:spLocks noGrp="1"/>
+          </p:cNvSpPr>
+          <p:nvPr>
+            <p:ph type="sldNum" sz="quarter" idx="12"/>
+          </p:nvPr>
+        </p:nvSpPr>
+        <p:spPr/>
+        <p:txBody>
+          <a:bodyPr/>
+          <a:lstStyle/>
+          <a:p>
+            <a:fld id="{6997B004-CFCE-48D1-9298-DADD64B1EF73}" type="slidenum">
+              <a:rPr lang="fr-FR" smtClean="0"/>
+              <a:t>7</a:t>
+            </a:fld>
+            <a:endParaRPr lang="fr-FR"/>
+          </a:p>
+        </p:txBody>
+      </p:sp>
+      <p:graphicFrame>
+        <p:nvGraphicFramePr>
+          <p:cNvPr id="3" name="Diagramme 2">
+            <a:extLst>
+              <a:ext uri="{FF2B5EF4-FFF2-40B4-BE49-F238E27FC236}">
+                <a16:creationId xmlns:a16="http://schemas.microsoft.com/office/drawing/2014/main" id="{5F0A7F54-DD9B-76D1-E741-15B9E542462A}"/>
+              </a:ext>
+            </a:extLst>
+          </p:cNvPr>
+          <p:cNvGraphicFramePr/>
+          <p:nvPr>
+            <p:extLst>
+              <p:ext uri="{D42A27DB-BD31-4B8C-83A1-F6EECF244321}">
+                <p14:modId xmlns:p14="http://schemas.microsoft.com/office/powerpoint/2010/main" val="1961492512"/>
+              </p:ext>
+            </p:extLst>
+          </p:nvPr>
+        </p:nvGraphicFramePr>
+        <p:xfrm>
+          <a:off x="2032000" y="719666"/>
+          <a:ext cx="8128000" cy="5418667"/>
+        </p:xfrm>
+        <a:graphic>
+          <a:graphicData uri="http://schemas.openxmlformats.org/drawingml/2006/diagram">
+            <dgm:relIds xmlns:dgm="http://schemas.openxmlformats.org/drawingml/2006/diagram" xmlns:r="http://schemas.openxmlformats.org/officeDocument/2006/relationships" r:dm="rId2" r:lo="rId3" r:qs="rId4" r:cs="rId5"/>
+          </a:graphicData>
+        </a:graphic>
+      </p:graphicFrame>
+    </p:spTree>
+    <p:extLst>
+      <p:ext uri="{BB962C8B-B14F-4D97-AF65-F5344CB8AC3E}">
+        <p14:creationId xmlns:p14="http://schemas.microsoft.com/office/powerpoint/2010/main" val="3648777401"/>
       </p:ext>
     </p:extLst>
   </p:cSld>

</xml_diff>